<commit_message>
Added starting point for schematic
</commit_message>
<xml_diff>
--- a/docs/Teams Sucks Presentation.pptx
+++ b/docs/Teams Sucks Presentation.pptx
@@ -6,6 +6,7 @@
   </p:sldMasterIdLst>
   <p:sldIdLst>
     <p:sldId id="256" r:id="rId2"/>
+    <p:sldId id="257" r:id="rId3"/>
   </p:sldIdLst>
   <p:sldSz cx="12192000" cy="6858000"/>
   <p:notesSz cx="6858000" cy="9144000"/>
@@ -104,6 +105,11 @@
       </a:defRPr>
     </a:lvl9pPr>
   </p:defaultTextStyle>
+  <p:extLst>
+    <p:ext uri="{EFAFB233-063F-42B5-8137-9DF3F51BA10A}">
+      <p15:sldGuideLst xmlns:p15="http://schemas.microsoft.com/office/powerpoint/2012/main"/>
+    </p:ext>
+  </p:extLst>
 </p:presentation>
 </file>
 
@@ -154,10 +160,7 @@
             </a:lvl1pPr>
           </a:lstStyle>
           <a:p>
-            <a:r>
-              <a:rPr lang="en-US"/>
-              <a:t>Click to edit Master title style</a:t>
-            </a:r>
+            <a:endParaRPr lang="en-US" dirty="0"/>
           </a:p>
         </p:txBody>
       </p:sp>
@@ -224,93 +227,7 @@
             </a:lvl9pPr>
           </a:lstStyle>
           <a:p>
-            <a:r>
-              <a:rPr lang="en-US"/>
-              <a:t>Click to edit Master subtitle style</a:t>
-            </a:r>
-          </a:p>
-        </p:txBody>
-      </p:sp>
-      <p:sp>
-        <p:nvSpPr>
-          <p:cNvPr id="4" name="Date Placeholder 3">
-            <a:extLst>
-              <a:ext uri="{FF2B5EF4-FFF2-40B4-BE49-F238E27FC236}">
-                <a16:creationId xmlns:a16="http://schemas.microsoft.com/office/drawing/2014/main" id="{80BB4737-854E-44E9-A296-7F62CD04F8BE}"/>
-              </a:ext>
-            </a:extLst>
-          </p:cNvPr>
-          <p:cNvSpPr>
-            <a:spLocks noGrp="1"/>
-          </p:cNvSpPr>
-          <p:nvPr>
-            <p:ph type="dt" sz="half" idx="10"/>
-          </p:nvPr>
-        </p:nvSpPr>
-        <p:spPr/>
-        <p:txBody>
-          <a:bodyPr/>
-          <a:lstStyle/>
-          <a:p>
-            <a:fld id="{8857C0AE-C8A8-4DE6-9322-18FE594FF65F}" type="datetimeFigureOut">
-              <a:rPr lang="en-US" smtClean="0"/>
-              <a:t>1/27/2022</a:t>
-            </a:fld>
-            <a:endParaRPr lang="en-US"/>
-          </a:p>
-        </p:txBody>
-      </p:sp>
-      <p:sp>
-        <p:nvSpPr>
-          <p:cNvPr id="5" name="Footer Placeholder 4">
-            <a:extLst>
-              <a:ext uri="{FF2B5EF4-FFF2-40B4-BE49-F238E27FC236}">
-                <a16:creationId xmlns:a16="http://schemas.microsoft.com/office/drawing/2014/main" id="{25DBA24A-D361-4E57-B91F-E30954DD56FB}"/>
-              </a:ext>
-            </a:extLst>
-          </p:cNvPr>
-          <p:cNvSpPr>
-            <a:spLocks noGrp="1"/>
-          </p:cNvSpPr>
-          <p:nvPr>
-            <p:ph type="ftr" sz="quarter" idx="11"/>
-          </p:nvPr>
-        </p:nvSpPr>
-        <p:spPr/>
-        <p:txBody>
-          <a:bodyPr/>
-          <a:lstStyle/>
-          <a:p>
-            <a:endParaRPr lang="en-US"/>
-          </a:p>
-        </p:txBody>
-      </p:sp>
-      <p:sp>
-        <p:nvSpPr>
-          <p:cNvPr id="6" name="Slide Number Placeholder 5">
-            <a:extLst>
-              <a:ext uri="{FF2B5EF4-FFF2-40B4-BE49-F238E27FC236}">
-                <a16:creationId xmlns:a16="http://schemas.microsoft.com/office/drawing/2014/main" id="{C4AA0F56-A040-4360-9E52-B8128ABC6E8E}"/>
-              </a:ext>
-            </a:extLst>
-          </p:cNvPr>
-          <p:cNvSpPr>
-            <a:spLocks noGrp="1"/>
-          </p:cNvSpPr>
-          <p:nvPr>
-            <p:ph type="sldNum" sz="quarter" idx="12"/>
-          </p:nvPr>
-        </p:nvSpPr>
-        <p:spPr/>
-        <p:txBody>
-          <a:bodyPr/>
-          <a:lstStyle/>
-          <a:p>
-            <a:fld id="{A784B025-6D13-49F0-9559-DCC40201FEE9}" type="slidenum">
-              <a:rPr lang="en-US" smtClean="0"/>
-              <a:t>‹#›</a:t>
-            </a:fld>
-            <a:endParaRPr lang="en-US"/>
+            <a:endParaRPr lang="en-US" dirty="0"/>
           </a:p>
         </p:txBody>
       </p:sp>
@@ -3307,6 +3224,17 @@
 <file path=ppt/slides/slide1.xml><?xml version="1.0" encoding="utf-8"?>
 <p:sld xmlns:a="http://schemas.openxmlformats.org/drawingml/2006/main" xmlns:r="http://schemas.openxmlformats.org/officeDocument/2006/relationships" xmlns:p="http://schemas.openxmlformats.org/presentationml/2006/main">
   <p:cSld>
+    <p:bg>
+      <p:bgPr>
+        <a:solidFill>
+          <a:schemeClr val="bg1">
+            <a:tint val="95000"/>
+            <a:satMod val="170000"/>
+          </a:schemeClr>
+        </a:solidFill>
+        <a:effectLst/>
+      </p:bgPr>
+    </p:bg>
     <p:spTree>
       <p:nvGrpSpPr>
         <p:cNvPr id="1" name=""/>
@@ -3337,44 +3265,1905 @@
             <p:ph type="ctrTitle"/>
           </p:nvPr>
         </p:nvSpPr>
-        <p:spPr/>
-        <p:txBody>
-          <a:bodyPr/>
-          <a:lstStyle/>
-          <a:p>
+        <p:spPr>
+          <a:xfrm>
+            <a:off x="4128368" y="4522156"/>
+            <a:ext cx="4937937" cy="1363215"/>
+          </a:xfrm>
+        </p:spPr>
+        <p:txBody>
+          <a:bodyPr anchor="t">
+            <a:normAutofit/>
+          </a:bodyPr>
+          <a:lstStyle/>
+          <a:p>
+            <a:pPr algn="l"/>
+            <a:r>
+              <a:rPr lang="en-GB" sz="5400" dirty="0"/>
+              <a:t>You’re on Mute</a:t>
+            </a:r>
+            <a:endParaRPr lang="en-US" sz="5400" dirty="0"/>
+          </a:p>
+        </p:txBody>
+      </p:sp>
+      <p:sp>
+        <p:nvSpPr>
+          <p:cNvPr id="3" name="Subtitle 2">
+            <a:extLst>
+              <a:ext uri="{FF2B5EF4-FFF2-40B4-BE49-F238E27FC236}">
+                <a16:creationId xmlns:a16="http://schemas.microsoft.com/office/drawing/2014/main" id="{8D4086D4-478A-47AB-9FEA-8026F7762C16}"/>
+              </a:ext>
+            </a:extLst>
+          </p:cNvPr>
+          <p:cNvSpPr>
+            <a:spLocks noGrp="1"/>
+          </p:cNvSpPr>
+          <p:nvPr>
+            <p:ph type="subTitle" idx="1"/>
+          </p:nvPr>
+        </p:nvSpPr>
+        <p:spPr>
+          <a:xfrm>
+            <a:off x="4128370" y="3945418"/>
+            <a:ext cx="4937936" cy="576738"/>
+          </a:xfrm>
+        </p:spPr>
+        <p:txBody>
+          <a:bodyPr anchor="b">
+            <a:normAutofit/>
+          </a:bodyPr>
+          <a:lstStyle/>
+          <a:p>
+            <a:pPr algn="l"/>
+            <a:r>
+              <a:rPr lang="en-GB" sz="2000" dirty="0"/>
+              <a:t>Hardware to Control M$ Teams</a:t>
+            </a:r>
+            <a:endParaRPr lang="en-US" sz="2000" dirty="0"/>
+          </a:p>
+        </p:txBody>
+      </p:sp>
+      <p:sp>
+        <p:nvSpPr>
+          <p:cNvPr id="13" name="Freeform: Shape 12">
+            <a:extLst>
+              <a:ext uri="{FF2B5EF4-FFF2-40B4-BE49-F238E27FC236}">
+                <a16:creationId xmlns:a16="http://schemas.microsoft.com/office/drawing/2014/main" id="{2E2D6188-24E5-426A-BB2A-3FA2D6B9C3EF}"/>
+              </a:ext>
+              <a:ext uri="{C183D7F6-B498-43B3-948B-1728B52AA6E4}">
+                <adec:decorative xmlns:adec="http://schemas.microsoft.com/office/drawing/2017/decorative" val="1"/>
+              </a:ext>
+            </a:extLst>
+          </p:cNvPr>
+          <p:cNvSpPr>
+            <a:spLocks noGrp="1" noRot="1" noChangeAspect="1" noMove="1" noResize="1" noEditPoints="1" noAdjustHandles="1" noChangeArrowheads="1" noChangeShapeType="1" noTextEdit="1"/>
+          </p:cNvSpPr>
+          <p:nvPr>
+            <p:extLst>
+              <p:ext uri="{386F3935-93C4-4BCD-93E2-E3B085C9AB24}">
+                <p16:designElem xmlns:p16="http://schemas.microsoft.com/office/powerpoint/2015/main" val="1"/>
+              </p:ext>
+            </p:extLst>
+          </p:nvPr>
+        </p:nvSpPr>
+        <p:spPr>
+          <a:xfrm>
+            <a:off x="0" y="2288331"/>
+            <a:ext cx="3564638" cy="4569668"/>
+          </a:xfrm>
+          <a:custGeom>
+            <a:avLst/>
+            <a:gdLst>
+              <a:gd name="connsiteX0" fmla="*/ 640080 w 3564638"/>
+              <a:gd name="connsiteY0" fmla="*/ 0 h 4569668"/>
+              <a:gd name="connsiteX1" fmla="*/ 3564638 w 3564638"/>
+              <a:gd name="connsiteY1" fmla="*/ 2924558 h 4569668"/>
+              <a:gd name="connsiteX2" fmla="*/ 3065170 w 3564638"/>
+              <a:gd name="connsiteY2" fmla="*/ 4559707 h 4569668"/>
+              <a:gd name="connsiteX3" fmla="*/ 3057720 w 3564638"/>
+              <a:gd name="connsiteY3" fmla="*/ 4569668 h 4569668"/>
+              <a:gd name="connsiteX4" fmla="*/ 0 w 3564638"/>
+              <a:gd name="connsiteY4" fmla="*/ 4569668 h 4569668"/>
+              <a:gd name="connsiteX5" fmla="*/ 0 w 3564638"/>
+              <a:gd name="connsiteY5" fmla="*/ 72448 h 4569668"/>
+              <a:gd name="connsiteX6" fmla="*/ 50679 w 3564638"/>
+              <a:gd name="connsiteY6" fmla="*/ 59417 h 4569668"/>
+              <a:gd name="connsiteX7" fmla="*/ 640080 w 3564638"/>
+              <a:gd name="connsiteY7" fmla="*/ 0 h 4569668"/>
+            </a:gdLst>
+            <a:ahLst/>
+            <a:cxnLst>
+              <a:cxn ang="0">
+                <a:pos x="connsiteX0" y="connsiteY0"/>
+              </a:cxn>
+              <a:cxn ang="0">
+                <a:pos x="connsiteX1" y="connsiteY1"/>
+              </a:cxn>
+              <a:cxn ang="0">
+                <a:pos x="connsiteX2" y="connsiteY2"/>
+              </a:cxn>
+              <a:cxn ang="0">
+                <a:pos x="connsiteX3" y="connsiteY3"/>
+              </a:cxn>
+              <a:cxn ang="0">
+                <a:pos x="connsiteX4" y="connsiteY4"/>
+              </a:cxn>
+              <a:cxn ang="0">
+                <a:pos x="connsiteX5" y="connsiteY5"/>
+              </a:cxn>
+              <a:cxn ang="0">
+                <a:pos x="connsiteX6" y="connsiteY6"/>
+              </a:cxn>
+              <a:cxn ang="0">
+                <a:pos x="connsiteX7" y="connsiteY7"/>
+              </a:cxn>
+            </a:cxnLst>
+            <a:rect l="l" t="t" r="r" b="b"/>
+            <a:pathLst>
+              <a:path w="3564638" h="4569668">
+                <a:moveTo>
+                  <a:pt x="640080" y="0"/>
+                </a:moveTo>
+                <a:cubicBezTo>
+                  <a:pt x="2255269" y="0"/>
+                  <a:pt x="3564638" y="1309369"/>
+                  <a:pt x="3564638" y="2924558"/>
+                </a:cubicBezTo>
+                <a:cubicBezTo>
+                  <a:pt x="3564638" y="3530254"/>
+                  <a:pt x="3380508" y="4092944"/>
+                  <a:pt x="3065170" y="4559707"/>
+                </a:cubicBezTo>
+                <a:lnTo>
+                  <a:pt x="3057720" y="4569668"/>
+                </a:lnTo>
+                <a:lnTo>
+                  <a:pt x="0" y="4569668"/>
+                </a:lnTo>
+                <a:lnTo>
+                  <a:pt x="0" y="72448"/>
+                </a:lnTo>
+                <a:lnTo>
+                  <a:pt x="50679" y="59417"/>
+                </a:lnTo>
+                <a:cubicBezTo>
+                  <a:pt x="241061" y="20459"/>
+                  <a:pt x="438181" y="0"/>
+                  <a:pt x="640080" y="0"/>
+                </a:cubicBezTo>
+                <a:close/>
+              </a:path>
+            </a:pathLst>
+          </a:custGeom>
+          <a:solidFill>
+            <a:schemeClr val="tx1"/>
+          </a:solidFill>
+          <a:ln>
+            <a:noFill/>
+          </a:ln>
+        </p:spPr>
+        <p:style>
+          <a:lnRef idx="2">
+            <a:schemeClr val="accent1">
+              <a:shade val="50000"/>
+            </a:schemeClr>
+          </a:lnRef>
+          <a:fillRef idx="1">
+            <a:schemeClr val="accent1"/>
+          </a:fillRef>
+          <a:effectRef idx="0">
+            <a:schemeClr val="accent1"/>
+          </a:effectRef>
+          <a:fontRef idx="minor">
+            <a:schemeClr val="lt1"/>
+          </a:fontRef>
+        </p:style>
+        <p:txBody>
+          <a:bodyPr wrap="square" rtlCol="0" anchor="ctr">
+            <a:noAutofit/>
+          </a:bodyPr>
+          <a:lstStyle/>
+          <a:p>
+            <a:pPr algn="ctr"/>
             <a:endParaRPr lang="en-US"/>
           </a:p>
         </p:txBody>
       </p:sp>
       <p:sp>
         <p:nvSpPr>
-          <p:cNvPr id="3" name="Subtitle 2">
-            <a:extLst>
-              <a:ext uri="{FF2B5EF4-FFF2-40B4-BE49-F238E27FC236}">
-                <a16:creationId xmlns:a16="http://schemas.microsoft.com/office/drawing/2014/main" id="{8D4086D4-478A-47AB-9FEA-8026F7762C16}"/>
-              </a:ext>
-            </a:extLst>
-          </p:cNvPr>
-          <p:cNvSpPr>
-            <a:spLocks noGrp="1"/>
-          </p:cNvSpPr>
-          <p:nvPr>
-            <p:ph type="subTitle" idx="1"/>
-          </p:nvPr>
-        </p:nvSpPr>
-        <p:spPr/>
-        <p:txBody>
-          <a:bodyPr/>
-          <a:lstStyle/>
-          <a:p>
+          <p:cNvPr id="15" name="Freeform: Shape 14">
+            <a:extLst>
+              <a:ext uri="{FF2B5EF4-FFF2-40B4-BE49-F238E27FC236}">
+                <a16:creationId xmlns:a16="http://schemas.microsoft.com/office/drawing/2014/main" id="{F6E384F5-137A-40B1-97F0-694CC6ECD59C}"/>
+              </a:ext>
+              <a:ext uri="{C183D7F6-B498-43B3-948B-1728B52AA6E4}">
+                <adec:decorative xmlns:adec="http://schemas.microsoft.com/office/drawing/2017/decorative" val="1"/>
+              </a:ext>
+            </a:extLst>
+          </p:cNvPr>
+          <p:cNvSpPr>
+            <a:spLocks noGrp="1" noRot="1" noChangeAspect="1" noMove="1" noResize="1" noEditPoints="1" noAdjustHandles="1" noChangeArrowheads="1" noChangeShapeType="1" noTextEdit="1"/>
+          </p:cNvSpPr>
+          <p:nvPr>
+            <p:extLst>
+              <p:ext uri="{386F3935-93C4-4BCD-93E2-E3B085C9AB24}">
+                <p16:designElem xmlns:p16="http://schemas.microsoft.com/office/powerpoint/2015/main" val="1"/>
+              </p:ext>
+            </p:extLst>
+          </p:nvPr>
+        </p:nvSpPr>
+        <p:spPr>
+          <a:xfrm>
+            <a:off x="0" y="2122218"/>
+            <a:ext cx="3730752" cy="4735782"/>
+          </a:xfrm>
+          <a:custGeom>
+            <a:avLst/>
+            <a:gdLst>
+              <a:gd name="connsiteX0" fmla="*/ 640080 w 3730752"/>
+              <a:gd name="connsiteY0" fmla="*/ 0 h 4735782"/>
+              <a:gd name="connsiteX1" fmla="*/ 3730752 w 3730752"/>
+              <a:gd name="connsiteY1" fmla="*/ 3090672 h 4735782"/>
+              <a:gd name="connsiteX2" fmla="*/ 3357725 w 3730752"/>
+              <a:gd name="connsiteY2" fmla="*/ 4563870 h 4735782"/>
+              <a:gd name="connsiteX3" fmla="*/ 3253285 w 3730752"/>
+              <a:gd name="connsiteY3" fmla="*/ 4735782 h 4735782"/>
+              <a:gd name="connsiteX4" fmla="*/ 0 w 3730752"/>
+              <a:gd name="connsiteY4" fmla="*/ 4735782 h 4735782"/>
+              <a:gd name="connsiteX5" fmla="*/ 0 w 3730752"/>
+              <a:gd name="connsiteY5" fmla="*/ 67215 h 4735782"/>
+              <a:gd name="connsiteX6" fmla="*/ 17202 w 3730752"/>
+              <a:gd name="connsiteY6" fmla="*/ 62792 h 4735782"/>
+              <a:gd name="connsiteX7" fmla="*/ 640080 w 3730752"/>
+              <a:gd name="connsiteY7" fmla="*/ 0 h 4735782"/>
+            </a:gdLst>
+            <a:ahLst/>
+            <a:cxnLst>
+              <a:cxn ang="0">
+                <a:pos x="connsiteX0" y="connsiteY0"/>
+              </a:cxn>
+              <a:cxn ang="0">
+                <a:pos x="connsiteX1" y="connsiteY1"/>
+              </a:cxn>
+              <a:cxn ang="0">
+                <a:pos x="connsiteX2" y="connsiteY2"/>
+              </a:cxn>
+              <a:cxn ang="0">
+                <a:pos x="connsiteX3" y="connsiteY3"/>
+              </a:cxn>
+              <a:cxn ang="0">
+                <a:pos x="connsiteX4" y="connsiteY4"/>
+              </a:cxn>
+              <a:cxn ang="0">
+                <a:pos x="connsiteX5" y="connsiteY5"/>
+              </a:cxn>
+              <a:cxn ang="0">
+                <a:pos x="connsiteX6" y="connsiteY6"/>
+              </a:cxn>
+              <a:cxn ang="0">
+                <a:pos x="connsiteX7" y="connsiteY7"/>
+              </a:cxn>
+            </a:cxnLst>
+            <a:rect l="l" t="t" r="r" b="b"/>
+            <a:pathLst>
+              <a:path w="3730752" h="4735782">
+                <a:moveTo>
+                  <a:pt x="640080" y="0"/>
+                </a:moveTo>
+                <a:cubicBezTo>
+                  <a:pt x="2347011" y="0"/>
+                  <a:pt x="3730752" y="1383741"/>
+                  <a:pt x="3730752" y="3090672"/>
+                </a:cubicBezTo>
+                <a:cubicBezTo>
+                  <a:pt x="3730752" y="3624088"/>
+                  <a:pt x="3595621" y="4125943"/>
+                  <a:pt x="3357725" y="4563870"/>
+                </a:cubicBezTo>
+                <a:lnTo>
+                  <a:pt x="3253285" y="4735782"/>
+                </a:lnTo>
+                <a:lnTo>
+                  <a:pt x="0" y="4735782"/>
+                </a:lnTo>
+                <a:lnTo>
+                  <a:pt x="0" y="67215"/>
+                </a:lnTo>
+                <a:lnTo>
+                  <a:pt x="17202" y="62792"/>
+                </a:lnTo>
+                <a:cubicBezTo>
+                  <a:pt x="218397" y="21621"/>
+                  <a:pt x="426714" y="0"/>
+                  <a:pt x="640080" y="0"/>
+                </a:cubicBezTo>
+                <a:close/>
+              </a:path>
+            </a:pathLst>
+          </a:custGeom>
+          <a:solidFill>
+            <a:srgbClr val="FFFFFF">
+              <a:alpha val="80000"/>
+            </a:srgbClr>
+          </a:solidFill>
+          <a:ln>
+            <a:noFill/>
+          </a:ln>
+        </p:spPr>
+        <p:style>
+          <a:lnRef idx="2">
+            <a:schemeClr val="accent1">
+              <a:shade val="50000"/>
+            </a:schemeClr>
+          </a:lnRef>
+          <a:fillRef idx="1">
+            <a:schemeClr val="accent1"/>
+          </a:fillRef>
+          <a:effectRef idx="0">
+            <a:schemeClr val="accent1"/>
+          </a:effectRef>
+          <a:fontRef idx="minor">
+            <a:schemeClr val="lt1"/>
+          </a:fontRef>
+        </p:style>
+        <p:txBody>
+          <a:bodyPr wrap="square" rtlCol="0" anchor="ctr">
+            <a:noAutofit/>
+          </a:bodyPr>
+          <a:lstStyle/>
+          <a:p>
+            <a:pPr marL="0" marR="0" lvl="0" indent="0" algn="ctr" defTabSz="914400" rtl="0" eaLnBrk="1" fontAlgn="auto" latinLnBrk="0" hangingPunct="1">
+              <a:lnSpc>
+                <a:spcPct val="100000"/>
+              </a:lnSpc>
+              <a:spcBef>
+                <a:spcPts val="0"/>
+              </a:spcBef>
+              <a:spcAft>
+                <a:spcPts val="0"/>
+              </a:spcAft>
+              <a:buClrTx/>
+              <a:buSzTx/>
+              <a:buFontTx/>
+              <a:buNone/>
+              <a:tabLst/>
+              <a:defRPr/>
+            </a:pPr>
+            <a:endParaRPr kumimoji="0" lang="en-US" sz="1800" b="0" i="0" u="none" strike="noStrike" kern="1200" cap="none" spc="0" normalizeH="0" baseline="0" noProof="0">
+              <a:ln>
+                <a:noFill/>
+              </a:ln>
+              <a:solidFill>
+                <a:prstClr val="white"/>
+              </a:solidFill>
+              <a:effectLst/>
+              <a:uLnTx/>
+              <a:uFillTx/>
+              <a:latin typeface="Calibri" panose="020F0502020204030204"/>
+              <a:ea typeface="+mn-ea"/>
+              <a:cs typeface="+mn-cs"/>
+            </a:endParaRPr>
+          </a:p>
+        </p:txBody>
+      </p:sp>
+      <p:sp>
+        <p:nvSpPr>
+          <p:cNvPr id="17" name="Freeform: Shape 16">
+            <a:extLst>
+              <a:ext uri="{FF2B5EF4-FFF2-40B4-BE49-F238E27FC236}">
+                <a16:creationId xmlns:a16="http://schemas.microsoft.com/office/drawing/2014/main" id="{9DBC4630-03DA-474F-BBCB-BA3AE6B317A4}"/>
+              </a:ext>
+              <a:ext uri="{C183D7F6-B498-43B3-948B-1728B52AA6E4}">
+                <adec:decorative xmlns:adec="http://schemas.microsoft.com/office/drawing/2017/decorative" val="1"/>
+              </a:ext>
+            </a:extLst>
+          </p:cNvPr>
+          <p:cNvSpPr>
+            <a:spLocks noGrp="1" noRot="1" noChangeAspect="1" noMove="1" noResize="1" noEditPoints="1" noAdjustHandles="1" noChangeArrowheads="1" noChangeShapeType="1" noTextEdit="1"/>
+          </p:cNvSpPr>
+          <p:nvPr>
+            <p:extLst>
+              <p:ext uri="{386F3935-93C4-4BCD-93E2-E3B085C9AB24}">
+                <p16:designElem xmlns:p16="http://schemas.microsoft.com/office/powerpoint/2015/main" val="1"/>
+              </p:ext>
+            </p:extLst>
+          </p:nvPr>
+        </p:nvSpPr>
+        <p:spPr>
+          <a:xfrm>
+            <a:off x="1081982" y="-4332"/>
+            <a:ext cx="4242816" cy="2454158"/>
+          </a:xfrm>
+          <a:custGeom>
+            <a:avLst/>
+            <a:gdLst>
+              <a:gd name="connsiteX0" fmla="*/ 28633 w 4242816"/>
+              <a:gd name="connsiteY0" fmla="*/ 0 h 2454158"/>
+              <a:gd name="connsiteX1" fmla="*/ 4214183 w 4242816"/>
+              <a:gd name="connsiteY1" fmla="*/ 0 h 2454158"/>
+              <a:gd name="connsiteX2" fmla="*/ 4231864 w 4242816"/>
+              <a:gd name="connsiteY2" fmla="*/ 115848 h 2454158"/>
+              <a:gd name="connsiteX3" fmla="*/ 4242816 w 4242816"/>
+              <a:gd name="connsiteY3" fmla="*/ 332750 h 2454158"/>
+              <a:gd name="connsiteX4" fmla="*/ 2121408 w 4242816"/>
+              <a:gd name="connsiteY4" fmla="*/ 2454158 h 2454158"/>
+              <a:gd name="connsiteX5" fmla="*/ 0 w 4242816"/>
+              <a:gd name="connsiteY5" fmla="*/ 332750 h 2454158"/>
+              <a:gd name="connsiteX6" fmla="*/ 10953 w 4242816"/>
+              <a:gd name="connsiteY6" fmla="*/ 115848 h 2454158"/>
+            </a:gdLst>
+            <a:ahLst/>
+            <a:cxnLst>
+              <a:cxn ang="0">
+                <a:pos x="connsiteX0" y="connsiteY0"/>
+              </a:cxn>
+              <a:cxn ang="0">
+                <a:pos x="connsiteX1" y="connsiteY1"/>
+              </a:cxn>
+              <a:cxn ang="0">
+                <a:pos x="connsiteX2" y="connsiteY2"/>
+              </a:cxn>
+              <a:cxn ang="0">
+                <a:pos x="connsiteX3" y="connsiteY3"/>
+              </a:cxn>
+              <a:cxn ang="0">
+                <a:pos x="connsiteX4" y="connsiteY4"/>
+              </a:cxn>
+              <a:cxn ang="0">
+                <a:pos x="connsiteX5" y="connsiteY5"/>
+              </a:cxn>
+              <a:cxn ang="0">
+                <a:pos x="connsiteX6" y="connsiteY6"/>
+              </a:cxn>
+            </a:cxnLst>
+            <a:rect l="l" t="t" r="r" b="b"/>
+            <a:pathLst>
+              <a:path w="4242816" h="2454158">
+                <a:moveTo>
+                  <a:pt x="28633" y="0"/>
+                </a:moveTo>
+                <a:lnTo>
+                  <a:pt x="4214183" y="0"/>
+                </a:lnTo>
+                <a:lnTo>
+                  <a:pt x="4231864" y="115848"/>
+                </a:lnTo>
+                <a:cubicBezTo>
+                  <a:pt x="4239106" y="187164"/>
+                  <a:pt x="4242816" y="259524"/>
+                  <a:pt x="4242816" y="332750"/>
+                </a:cubicBezTo>
+                <a:cubicBezTo>
+                  <a:pt x="4242816" y="1504371"/>
+                  <a:pt x="3293029" y="2454158"/>
+                  <a:pt x="2121408" y="2454158"/>
+                </a:cubicBezTo>
+                <a:cubicBezTo>
+                  <a:pt x="949787" y="2454158"/>
+                  <a:pt x="0" y="1504371"/>
+                  <a:pt x="0" y="332750"/>
+                </a:cubicBezTo>
+                <a:cubicBezTo>
+                  <a:pt x="0" y="259524"/>
+                  <a:pt x="3710" y="187164"/>
+                  <a:pt x="10953" y="115848"/>
+                </a:cubicBezTo>
+                <a:close/>
+              </a:path>
+            </a:pathLst>
+          </a:custGeom>
+          <a:solidFill>
+            <a:srgbClr val="FFFFFF">
+              <a:alpha val="80000"/>
+            </a:srgbClr>
+          </a:solidFill>
+          <a:ln>
+            <a:noFill/>
+          </a:ln>
+        </p:spPr>
+        <p:style>
+          <a:lnRef idx="2">
+            <a:schemeClr val="accent1">
+              <a:shade val="50000"/>
+            </a:schemeClr>
+          </a:lnRef>
+          <a:fillRef idx="1">
+            <a:schemeClr val="accent1"/>
+          </a:fillRef>
+          <a:effectRef idx="0">
+            <a:schemeClr val="accent1"/>
+          </a:effectRef>
+          <a:fontRef idx="minor">
+            <a:schemeClr val="lt1"/>
+          </a:fontRef>
+        </p:style>
+        <p:txBody>
+          <a:bodyPr wrap="square" rtlCol="0" anchor="ctr">
+            <a:noAutofit/>
+          </a:bodyPr>
+          <a:lstStyle/>
+          <a:p>
+            <a:pPr marL="0" marR="0" lvl="0" indent="0" algn="ctr" defTabSz="914400" rtl="0" eaLnBrk="1" fontAlgn="auto" latinLnBrk="0" hangingPunct="1">
+              <a:lnSpc>
+                <a:spcPct val="100000"/>
+              </a:lnSpc>
+              <a:spcBef>
+                <a:spcPts val="0"/>
+              </a:spcBef>
+              <a:spcAft>
+                <a:spcPts val="0"/>
+              </a:spcAft>
+              <a:buClrTx/>
+              <a:buSzTx/>
+              <a:buFontTx/>
+              <a:buNone/>
+              <a:tabLst/>
+              <a:defRPr/>
+            </a:pPr>
+            <a:endParaRPr kumimoji="0" lang="en-US" sz="1800" b="0" i="0" u="none" strike="noStrike" kern="1200" cap="none" spc="0" normalizeH="0" baseline="0" noProof="0">
+              <a:ln>
+                <a:noFill/>
+              </a:ln>
+              <a:solidFill>
+                <a:prstClr val="white"/>
+              </a:solidFill>
+              <a:effectLst/>
+              <a:uLnTx/>
+              <a:uFillTx/>
+              <a:latin typeface="Calibri" panose="020F0502020204030204"/>
+              <a:ea typeface="+mn-ea"/>
+              <a:cs typeface="+mn-cs"/>
+            </a:endParaRPr>
+          </a:p>
+        </p:txBody>
+      </p:sp>
+      <p:sp>
+        <p:nvSpPr>
+          <p:cNvPr id="19" name="Freeform: Shape 18">
+            <a:extLst>
+              <a:ext uri="{FF2B5EF4-FFF2-40B4-BE49-F238E27FC236}">
+                <a16:creationId xmlns:a16="http://schemas.microsoft.com/office/drawing/2014/main" id="{1208BC59-C84F-483F-80CD-FAEC74229B97}"/>
+              </a:ext>
+              <a:ext uri="{C183D7F6-B498-43B3-948B-1728B52AA6E4}">
+                <adec:decorative xmlns:adec="http://schemas.microsoft.com/office/drawing/2017/decorative" val="1"/>
+              </a:ext>
+            </a:extLst>
+          </p:cNvPr>
+          <p:cNvSpPr>
+            <a:spLocks noGrp="1" noRot="1" noChangeAspect="1" noMove="1" noResize="1" noEditPoints="1" noAdjustHandles="1" noChangeArrowheads="1" noChangeShapeType="1" noTextEdit="1"/>
+          </p:cNvSpPr>
+          <p:nvPr>
+            <p:extLst>
+              <p:ext uri="{386F3935-93C4-4BCD-93E2-E3B085C9AB24}">
+                <p16:designElem xmlns:p16="http://schemas.microsoft.com/office/powerpoint/2015/main" val="1"/>
+              </p:ext>
+            </p:extLst>
+          </p:nvPr>
+        </p:nvSpPr>
+        <p:spPr>
+          <a:xfrm>
+            <a:off x="1246573" y="0"/>
+            <a:ext cx="3913632" cy="2285234"/>
+          </a:xfrm>
+          <a:custGeom>
+            <a:avLst/>
+            <a:gdLst>
+              <a:gd name="connsiteX0" fmla="*/ 29691 w 3913632"/>
+              <a:gd name="connsiteY0" fmla="*/ 0 h 2285234"/>
+              <a:gd name="connsiteX1" fmla="*/ 3883942 w 3913632"/>
+              <a:gd name="connsiteY1" fmla="*/ 0 h 2285234"/>
+              <a:gd name="connsiteX2" fmla="*/ 3903529 w 3913632"/>
+              <a:gd name="connsiteY2" fmla="*/ 128345 h 2285234"/>
+              <a:gd name="connsiteX3" fmla="*/ 3913632 w 3913632"/>
+              <a:gd name="connsiteY3" fmla="*/ 328418 h 2285234"/>
+              <a:gd name="connsiteX4" fmla="*/ 1956816 w 3913632"/>
+              <a:gd name="connsiteY4" fmla="*/ 2285234 h 2285234"/>
+              <a:gd name="connsiteX5" fmla="*/ 0 w 3913632"/>
+              <a:gd name="connsiteY5" fmla="*/ 328418 h 2285234"/>
+              <a:gd name="connsiteX6" fmla="*/ 10103 w 3913632"/>
+              <a:gd name="connsiteY6" fmla="*/ 128345 h 2285234"/>
+            </a:gdLst>
+            <a:ahLst/>
+            <a:cxnLst>
+              <a:cxn ang="0">
+                <a:pos x="connsiteX0" y="connsiteY0"/>
+              </a:cxn>
+              <a:cxn ang="0">
+                <a:pos x="connsiteX1" y="connsiteY1"/>
+              </a:cxn>
+              <a:cxn ang="0">
+                <a:pos x="connsiteX2" y="connsiteY2"/>
+              </a:cxn>
+              <a:cxn ang="0">
+                <a:pos x="connsiteX3" y="connsiteY3"/>
+              </a:cxn>
+              <a:cxn ang="0">
+                <a:pos x="connsiteX4" y="connsiteY4"/>
+              </a:cxn>
+              <a:cxn ang="0">
+                <a:pos x="connsiteX5" y="connsiteY5"/>
+              </a:cxn>
+              <a:cxn ang="0">
+                <a:pos x="connsiteX6" y="connsiteY6"/>
+              </a:cxn>
+            </a:cxnLst>
+            <a:rect l="l" t="t" r="r" b="b"/>
+            <a:pathLst>
+              <a:path w="3913632" h="2285234">
+                <a:moveTo>
+                  <a:pt x="29691" y="0"/>
+                </a:moveTo>
+                <a:lnTo>
+                  <a:pt x="3883942" y="0"/>
+                </a:lnTo>
+                <a:lnTo>
+                  <a:pt x="3903529" y="128345"/>
+                </a:lnTo>
+                <a:cubicBezTo>
+                  <a:pt x="3910210" y="194127"/>
+                  <a:pt x="3913632" y="260873"/>
+                  <a:pt x="3913632" y="328418"/>
+                </a:cubicBezTo>
+                <a:cubicBezTo>
+                  <a:pt x="3913632" y="1409138"/>
+                  <a:pt x="3037536" y="2285234"/>
+                  <a:pt x="1956816" y="2285234"/>
+                </a:cubicBezTo>
+                <a:cubicBezTo>
+                  <a:pt x="876096" y="2285234"/>
+                  <a:pt x="0" y="1409138"/>
+                  <a:pt x="0" y="328418"/>
+                </a:cubicBezTo>
+                <a:cubicBezTo>
+                  <a:pt x="0" y="260873"/>
+                  <a:pt x="3422" y="194127"/>
+                  <a:pt x="10103" y="128345"/>
+                </a:cubicBezTo>
+                <a:close/>
+              </a:path>
+            </a:pathLst>
+          </a:custGeom>
+          <a:solidFill>
+            <a:schemeClr val="tx1"/>
+          </a:solidFill>
+          <a:ln>
+            <a:noFill/>
+          </a:ln>
+        </p:spPr>
+        <p:style>
+          <a:lnRef idx="2">
+            <a:schemeClr val="accent1">
+              <a:shade val="50000"/>
+            </a:schemeClr>
+          </a:lnRef>
+          <a:fillRef idx="1">
+            <a:schemeClr val="accent1"/>
+          </a:fillRef>
+          <a:effectRef idx="0">
+            <a:schemeClr val="accent1"/>
+          </a:effectRef>
+          <a:fontRef idx="minor">
+            <a:schemeClr val="lt1"/>
+          </a:fontRef>
+        </p:style>
+        <p:txBody>
+          <a:bodyPr wrap="square" rtlCol="0" anchor="ctr">
+            <a:noAutofit/>
+          </a:bodyPr>
+          <a:lstStyle/>
+          <a:p>
+            <a:pPr algn="ctr"/>
             <a:endParaRPr lang="en-US"/>
           </a:p>
         </p:txBody>
       </p:sp>
+      <p:sp>
+        <p:nvSpPr>
+          <p:cNvPr id="21" name="Freeform: Shape 20">
+            <a:extLst>
+              <a:ext uri="{FF2B5EF4-FFF2-40B4-BE49-F238E27FC236}">
+                <a16:creationId xmlns:a16="http://schemas.microsoft.com/office/drawing/2014/main" id="{A1DABD52-05DF-4F31-AFB9-B330D8BE46FD}"/>
+              </a:ext>
+              <a:ext uri="{C183D7F6-B498-43B3-948B-1728B52AA6E4}">
+                <adec:decorative xmlns:adec="http://schemas.microsoft.com/office/drawing/2017/decorative" val="1"/>
+              </a:ext>
+            </a:extLst>
+          </p:cNvPr>
+          <p:cNvSpPr>
+            <a:spLocks noGrp="1" noRot="1" noChangeAspect="1" noMove="1" noResize="1" noEditPoints="1" noAdjustHandles="1" noChangeArrowheads="1" noChangeShapeType="1" noTextEdit="1"/>
+          </p:cNvSpPr>
+          <p:nvPr>
+            <p:extLst>
+              <p:ext uri="{386F3935-93C4-4BCD-93E2-E3B085C9AB24}">
+                <p16:designElem xmlns:p16="http://schemas.microsoft.com/office/powerpoint/2015/main" val="1"/>
+              </p:ext>
+            </p:extLst>
+          </p:nvPr>
+        </p:nvSpPr>
+        <p:spPr>
+          <a:xfrm>
+            <a:off x="5525559" y="725908"/>
+            <a:ext cx="2852928" cy="2852928"/>
+          </a:xfrm>
+          <a:custGeom>
+            <a:avLst/>
+            <a:gdLst>
+              <a:gd name="connsiteX0" fmla="*/ 1426464 w 2852928"/>
+              <a:gd name="connsiteY0" fmla="*/ 0 h 2852928"/>
+              <a:gd name="connsiteX1" fmla="*/ 2852928 w 2852928"/>
+              <a:gd name="connsiteY1" fmla="*/ 1426464 h 2852928"/>
+              <a:gd name="connsiteX2" fmla="*/ 1426464 w 2852928"/>
+              <a:gd name="connsiteY2" fmla="*/ 2852928 h 2852928"/>
+              <a:gd name="connsiteX3" fmla="*/ 0 w 2852928"/>
+              <a:gd name="connsiteY3" fmla="*/ 1426464 h 2852928"/>
+              <a:gd name="connsiteX4" fmla="*/ 1426464 w 2852928"/>
+              <a:gd name="connsiteY4" fmla="*/ 0 h 2852928"/>
+            </a:gdLst>
+            <a:ahLst/>
+            <a:cxnLst>
+              <a:cxn ang="0">
+                <a:pos x="connsiteX0" y="connsiteY0"/>
+              </a:cxn>
+              <a:cxn ang="0">
+                <a:pos x="connsiteX1" y="connsiteY1"/>
+              </a:cxn>
+              <a:cxn ang="0">
+                <a:pos x="connsiteX2" y="connsiteY2"/>
+              </a:cxn>
+              <a:cxn ang="0">
+                <a:pos x="connsiteX3" y="connsiteY3"/>
+              </a:cxn>
+              <a:cxn ang="0">
+                <a:pos x="connsiteX4" y="connsiteY4"/>
+              </a:cxn>
+            </a:cxnLst>
+            <a:rect l="l" t="t" r="r" b="b"/>
+            <a:pathLst>
+              <a:path w="2852928" h="2852928">
+                <a:moveTo>
+                  <a:pt x="1426464" y="0"/>
+                </a:moveTo>
+                <a:cubicBezTo>
+                  <a:pt x="2214278" y="0"/>
+                  <a:pt x="2852928" y="638650"/>
+                  <a:pt x="2852928" y="1426464"/>
+                </a:cubicBezTo>
+                <a:cubicBezTo>
+                  <a:pt x="2852928" y="2214278"/>
+                  <a:pt x="2214278" y="2852928"/>
+                  <a:pt x="1426464" y="2852928"/>
+                </a:cubicBezTo>
+                <a:cubicBezTo>
+                  <a:pt x="638650" y="2852928"/>
+                  <a:pt x="0" y="2214278"/>
+                  <a:pt x="0" y="1426464"/>
+                </a:cubicBezTo>
+                <a:cubicBezTo>
+                  <a:pt x="0" y="638650"/>
+                  <a:pt x="638650" y="0"/>
+                  <a:pt x="1426464" y="0"/>
+                </a:cubicBezTo>
+                <a:close/>
+              </a:path>
+            </a:pathLst>
+          </a:custGeom>
+          <a:solidFill>
+            <a:schemeClr val="tx1"/>
+          </a:solidFill>
+          <a:ln>
+            <a:noFill/>
+          </a:ln>
+        </p:spPr>
+        <p:style>
+          <a:lnRef idx="2">
+            <a:schemeClr val="accent1">
+              <a:shade val="50000"/>
+            </a:schemeClr>
+          </a:lnRef>
+          <a:fillRef idx="1">
+            <a:schemeClr val="accent1"/>
+          </a:fillRef>
+          <a:effectRef idx="0">
+            <a:schemeClr val="accent1"/>
+          </a:effectRef>
+          <a:fontRef idx="minor">
+            <a:schemeClr val="lt1"/>
+          </a:fontRef>
+        </p:style>
+        <p:txBody>
+          <a:bodyPr wrap="square" rtlCol="0" anchor="ctr">
+            <a:noAutofit/>
+          </a:bodyPr>
+          <a:lstStyle/>
+          <a:p>
+            <a:pPr algn="ctr"/>
+            <a:endParaRPr lang="en-US"/>
+          </a:p>
+        </p:txBody>
+      </p:sp>
+      <p:sp>
+        <p:nvSpPr>
+          <p:cNvPr id="23" name="Oval 22">
+            <a:extLst>
+              <a:ext uri="{FF2B5EF4-FFF2-40B4-BE49-F238E27FC236}">
+                <a16:creationId xmlns:a16="http://schemas.microsoft.com/office/drawing/2014/main" id="{78418A25-6EAC-4140-BFE6-284E1925B5EE}"/>
+              </a:ext>
+              <a:ext uri="{C183D7F6-B498-43B3-948B-1728B52AA6E4}">
+                <adec:decorative xmlns:adec="http://schemas.microsoft.com/office/drawing/2017/decorative" val="1"/>
+              </a:ext>
+            </a:extLst>
+          </p:cNvPr>
+          <p:cNvSpPr>
+            <a:spLocks noGrp="1" noRot="1" noChangeAspect="1" noMove="1" noResize="1" noEditPoints="1" noAdjustHandles="1" noChangeArrowheads="1" noChangeShapeType="1" noTextEdit="1"/>
+          </p:cNvSpPr>
+          <p:nvPr>
+            <p:extLst>
+              <p:ext uri="{386F3935-93C4-4BCD-93E2-E3B085C9AB24}">
+                <p16:designElem xmlns:p16="http://schemas.microsoft.com/office/powerpoint/2015/main" val="1"/>
+              </p:ext>
+            </p:extLst>
+          </p:nvPr>
+        </p:nvSpPr>
+        <p:spPr>
+          <a:xfrm>
+            <a:off x="5360967" y="561316"/>
+            <a:ext cx="3182112" cy="3182112"/>
+          </a:xfrm>
+          <a:prstGeom prst="ellipse">
+            <a:avLst/>
+          </a:prstGeom>
+          <a:solidFill>
+            <a:srgbClr val="FFFFFF">
+              <a:alpha val="80000"/>
+            </a:srgbClr>
+          </a:solidFill>
+          <a:ln>
+            <a:noFill/>
+          </a:ln>
+        </p:spPr>
+        <p:style>
+          <a:lnRef idx="2">
+            <a:schemeClr val="accent1">
+              <a:shade val="50000"/>
+            </a:schemeClr>
+          </a:lnRef>
+          <a:fillRef idx="1">
+            <a:schemeClr val="accent1"/>
+          </a:fillRef>
+          <a:effectRef idx="0">
+            <a:schemeClr val="accent1"/>
+          </a:effectRef>
+          <a:fontRef idx="minor">
+            <a:schemeClr val="lt1"/>
+          </a:fontRef>
+        </p:style>
+        <p:txBody>
+          <a:bodyPr rtlCol="0" anchor="ctr"/>
+          <a:lstStyle/>
+          <a:p>
+            <a:pPr marL="0" marR="0" lvl="0" indent="0" algn="ctr" defTabSz="914400" rtl="0" eaLnBrk="1" fontAlgn="auto" latinLnBrk="0" hangingPunct="1">
+              <a:lnSpc>
+                <a:spcPct val="100000"/>
+              </a:lnSpc>
+              <a:spcBef>
+                <a:spcPts val="0"/>
+              </a:spcBef>
+              <a:spcAft>
+                <a:spcPts val="0"/>
+              </a:spcAft>
+              <a:buClrTx/>
+              <a:buSzTx/>
+              <a:buFontTx/>
+              <a:buNone/>
+              <a:tabLst/>
+              <a:defRPr/>
+            </a:pPr>
+            <a:endParaRPr kumimoji="0" lang="en-US" sz="1800" b="0" i="0" u="none" strike="noStrike" kern="1200" cap="none" spc="0" normalizeH="0" baseline="0" noProof="0">
+              <a:ln>
+                <a:noFill/>
+              </a:ln>
+              <a:solidFill>
+                <a:prstClr val="white"/>
+              </a:solidFill>
+              <a:effectLst/>
+              <a:uLnTx/>
+              <a:uFillTx/>
+              <a:latin typeface="Calibri" panose="020F0502020204030204"/>
+              <a:ea typeface="+mn-ea"/>
+              <a:cs typeface="+mn-cs"/>
+            </a:endParaRPr>
+          </a:p>
+        </p:txBody>
+      </p:sp>
+      <p:pic>
+        <p:nvPicPr>
+          <p:cNvPr id="6" name="Picture 5" descr="A picture containing tool&#10;&#10;Description automatically generated">
+            <a:extLst>
+              <a:ext uri="{FF2B5EF4-FFF2-40B4-BE49-F238E27FC236}">
+                <a16:creationId xmlns:a16="http://schemas.microsoft.com/office/drawing/2014/main" id="{C2169F7B-915D-4E94-A479-DAF443265A5A}"/>
+              </a:ext>
+            </a:extLst>
+          </p:cNvPr>
+          <p:cNvPicPr>
+            <a:picLocks noChangeAspect="1"/>
+          </p:cNvPicPr>
+          <p:nvPr/>
+        </p:nvPicPr>
+        <p:blipFill>
+          <a:blip r:embed="rId2">
+            <a:extLst>
+              <a:ext uri="{28A0092B-C50C-407E-A947-70E740481C1C}">
+                <a14:useLocalDpi xmlns:a14="http://schemas.microsoft.com/office/drawing/2010/main" val="0"/>
+              </a:ext>
+            </a:extLst>
+          </a:blip>
+          <a:stretch>
+            <a:fillRect/>
+          </a:stretch>
+        </p:blipFill>
+        <p:spPr>
+          <a:xfrm rot="5400000">
+            <a:off x="2288563" y="-155255"/>
+            <a:ext cx="1829652" cy="1829652"/>
+          </a:xfrm>
+          <a:prstGeom prst="rect">
+            <a:avLst/>
+          </a:prstGeom>
+        </p:spPr>
+      </p:pic>
+      <p:sp>
+        <p:nvSpPr>
+          <p:cNvPr id="25" name="Freeform: Shape 24">
+            <a:extLst>
+              <a:ext uri="{FF2B5EF4-FFF2-40B4-BE49-F238E27FC236}">
+                <a16:creationId xmlns:a16="http://schemas.microsoft.com/office/drawing/2014/main" id="{6B9D64DB-4D5C-4A91-B45F-F301E3174F9F}"/>
+              </a:ext>
+              <a:ext uri="{C183D7F6-B498-43B3-948B-1728B52AA6E4}">
+                <adec:decorative xmlns:adec="http://schemas.microsoft.com/office/drawing/2017/decorative" val="1"/>
+              </a:ext>
+            </a:extLst>
+          </p:cNvPr>
+          <p:cNvSpPr>
+            <a:spLocks noGrp="1" noRot="1" noChangeAspect="1" noMove="1" noResize="1" noEditPoints="1" noAdjustHandles="1" noChangeArrowheads="1" noChangeShapeType="1" noTextEdit="1"/>
+          </p:cNvSpPr>
+          <p:nvPr>
+            <p:extLst>
+              <p:ext uri="{386F3935-93C4-4BCD-93E2-E3B085C9AB24}">
+                <p16:designElem xmlns:p16="http://schemas.microsoft.com/office/powerpoint/2015/main" val="1"/>
+              </p:ext>
+            </p:extLst>
+          </p:nvPr>
+        </p:nvSpPr>
+        <p:spPr>
+          <a:xfrm>
+            <a:off x="8752568" y="-4332"/>
+            <a:ext cx="3439432" cy="3550083"/>
+          </a:xfrm>
+          <a:custGeom>
+            <a:avLst/>
+            <a:gdLst>
+              <a:gd name="connsiteX0" fmla="*/ 115336 w 3439432"/>
+              <a:gd name="connsiteY0" fmla="*/ 0 h 3550083"/>
+              <a:gd name="connsiteX1" fmla="*/ 3439432 w 3439432"/>
+              <a:gd name="connsiteY1" fmla="*/ 0 h 3550083"/>
+              <a:gd name="connsiteX2" fmla="*/ 3439432 w 3439432"/>
+              <a:gd name="connsiteY2" fmla="*/ 3462762 h 3550083"/>
+              <a:gd name="connsiteX3" fmla="*/ 3318024 w 3439432"/>
+              <a:gd name="connsiteY3" fmla="*/ 3493980 h 3550083"/>
+              <a:gd name="connsiteX4" fmla="*/ 2761488 w 3439432"/>
+              <a:gd name="connsiteY4" fmla="*/ 3550083 h 3550083"/>
+              <a:gd name="connsiteX5" fmla="*/ 0 w 3439432"/>
+              <a:gd name="connsiteY5" fmla="*/ 788595 h 3550083"/>
+              <a:gd name="connsiteX6" fmla="*/ 70713 w 3439432"/>
+              <a:gd name="connsiteY6" fmla="*/ 164949 h 3550083"/>
+            </a:gdLst>
+            <a:ahLst/>
+            <a:cxnLst>
+              <a:cxn ang="0">
+                <a:pos x="connsiteX0" y="connsiteY0"/>
+              </a:cxn>
+              <a:cxn ang="0">
+                <a:pos x="connsiteX1" y="connsiteY1"/>
+              </a:cxn>
+              <a:cxn ang="0">
+                <a:pos x="connsiteX2" y="connsiteY2"/>
+              </a:cxn>
+              <a:cxn ang="0">
+                <a:pos x="connsiteX3" y="connsiteY3"/>
+              </a:cxn>
+              <a:cxn ang="0">
+                <a:pos x="connsiteX4" y="connsiteY4"/>
+              </a:cxn>
+              <a:cxn ang="0">
+                <a:pos x="connsiteX5" y="connsiteY5"/>
+              </a:cxn>
+              <a:cxn ang="0">
+                <a:pos x="connsiteX6" y="connsiteY6"/>
+              </a:cxn>
+            </a:cxnLst>
+            <a:rect l="l" t="t" r="r" b="b"/>
+            <a:pathLst>
+              <a:path w="3439432" h="3550083">
+                <a:moveTo>
+                  <a:pt x="115336" y="0"/>
+                </a:moveTo>
+                <a:lnTo>
+                  <a:pt x="3439432" y="0"/>
+                </a:lnTo>
+                <a:lnTo>
+                  <a:pt x="3439432" y="3462762"/>
+                </a:lnTo>
+                <a:lnTo>
+                  <a:pt x="3318024" y="3493980"/>
+                </a:lnTo>
+                <a:cubicBezTo>
+                  <a:pt x="3138258" y="3530765"/>
+                  <a:pt x="2952129" y="3550083"/>
+                  <a:pt x="2761488" y="3550083"/>
+                </a:cubicBezTo>
+                <a:cubicBezTo>
+                  <a:pt x="1236360" y="3550083"/>
+                  <a:pt x="0" y="2313723"/>
+                  <a:pt x="0" y="788595"/>
+                </a:cubicBezTo>
+                <a:cubicBezTo>
+                  <a:pt x="0" y="574124"/>
+                  <a:pt x="24450" y="365364"/>
+                  <a:pt x="70713" y="164949"/>
+                </a:cubicBezTo>
+                <a:close/>
+              </a:path>
+            </a:pathLst>
+          </a:custGeom>
+          <a:solidFill>
+            <a:srgbClr val="FFFFFF">
+              <a:alpha val="80000"/>
+            </a:srgbClr>
+          </a:solidFill>
+          <a:ln>
+            <a:noFill/>
+          </a:ln>
+        </p:spPr>
+        <p:style>
+          <a:lnRef idx="2">
+            <a:schemeClr val="accent1">
+              <a:shade val="50000"/>
+            </a:schemeClr>
+          </a:lnRef>
+          <a:fillRef idx="1">
+            <a:schemeClr val="accent1"/>
+          </a:fillRef>
+          <a:effectRef idx="0">
+            <a:schemeClr val="accent1"/>
+          </a:effectRef>
+          <a:fontRef idx="minor">
+            <a:schemeClr val="lt1"/>
+          </a:fontRef>
+        </p:style>
+        <p:txBody>
+          <a:bodyPr wrap="square" rtlCol="0" anchor="ctr">
+            <a:noAutofit/>
+          </a:bodyPr>
+          <a:lstStyle/>
+          <a:p>
+            <a:pPr marL="0" marR="0" lvl="0" indent="0" algn="ctr" defTabSz="914400" rtl="0" eaLnBrk="1" fontAlgn="auto" latinLnBrk="0" hangingPunct="1">
+              <a:lnSpc>
+                <a:spcPct val="100000"/>
+              </a:lnSpc>
+              <a:spcBef>
+                <a:spcPts val="0"/>
+              </a:spcBef>
+              <a:spcAft>
+                <a:spcPts val="0"/>
+              </a:spcAft>
+              <a:buClrTx/>
+              <a:buSzTx/>
+              <a:buFontTx/>
+              <a:buNone/>
+              <a:tabLst/>
+              <a:defRPr/>
+            </a:pPr>
+            <a:endParaRPr kumimoji="0" lang="en-US" sz="1800" b="0" i="0" u="none" strike="noStrike" kern="1200" cap="none" spc="0" normalizeH="0" baseline="0" noProof="0" dirty="0">
+              <a:ln>
+                <a:noFill/>
+              </a:ln>
+              <a:solidFill>
+                <a:prstClr val="white"/>
+              </a:solidFill>
+              <a:effectLst/>
+              <a:uLnTx/>
+              <a:uFillTx/>
+              <a:latin typeface="Calibri" panose="020F0502020204030204"/>
+              <a:ea typeface="+mn-ea"/>
+              <a:cs typeface="+mn-cs"/>
+            </a:endParaRPr>
+          </a:p>
+        </p:txBody>
+      </p:sp>
+      <p:sp>
+        <p:nvSpPr>
+          <p:cNvPr id="27" name="Freeform: Shape 26">
+            <a:extLst>
+              <a:ext uri="{FF2B5EF4-FFF2-40B4-BE49-F238E27FC236}">
+                <a16:creationId xmlns:a16="http://schemas.microsoft.com/office/drawing/2014/main" id="{8E4F04B5-4D4A-4F70-8549-384AF535134B}"/>
+              </a:ext>
+              <a:ext uri="{C183D7F6-B498-43B3-948B-1728B52AA6E4}">
+                <adec:decorative xmlns:adec="http://schemas.microsoft.com/office/drawing/2017/decorative" val="1"/>
+              </a:ext>
+            </a:extLst>
+          </p:cNvPr>
+          <p:cNvSpPr>
+            <a:spLocks noGrp="1" noRot="1" noChangeAspect="1" noMove="1" noResize="1" noEditPoints="1" noAdjustHandles="1" noChangeArrowheads="1" noChangeShapeType="1" noTextEdit="1"/>
+          </p:cNvSpPr>
+          <p:nvPr>
+            <p:extLst>
+              <p:ext uri="{386F3935-93C4-4BCD-93E2-E3B085C9AB24}">
+                <p16:designElem xmlns:p16="http://schemas.microsoft.com/office/powerpoint/2015/main" val="1"/>
+              </p:ext>
+            </p:extLst>
+          </p:nvPr>
+        </p:nvSpPr>
+        <p:spPr>
+          <a:xfrm>
+            <a:off x="8918761" y="-4330"/>
+            <a:ext cx="3273238" cy="3383891"/>
+          </a:xfrm>
+          <a:custGeom>
+            <a:avLst/>
+            <a:gdLst>
+              <a:gd name="connsiteX0" fmla="*/ 122841 w 3273238"/>
+              <a:gd name="connsiteY0" fmla="*/ 0 h 3383891"/>
+              <a:gd name="connsiteX1" fmla="*/ 3273238 w 3273238"/>
+              <a:gd name="connsiteY1" fmla="*/ 0 h 3383891"/>
+              <a:gd name="connsiteX2" fmla="*/ 3273238 w 3273238"/>
+              <a:gd name="connsiteY2" fmla="*/ 3291335 h 3383891"/>
+              <a:gd name="connsiteX3" fmla="*/ 3118338 w 3273238"/>
+              <a:gd name="connsiteY3" fmla="*/ 3331164 h 3383891"/>
+              <a:gd name="connsiteX4" fmla="*/ 2595295 w 3273238"/>
+              <a:gd name="connsiteY4" fmla="*/ 3383891 h 3383891"/>
+              <a:gd name="connsiteX5" fmla="*/ 0 w 3273238"/>
+              <a:gd name="connsiteY5" fmla="*/ 788596 h 3383891"/>
+              <a:gd name="connsiteX6" fmla="*/ 116679 w 3273238"/>
+              <a:gd name="connsiteY6" fmla="*/ 16835 h 3383891"/>
+            </a:gdLst>
+            <a:ahLst/>
+            <a:cxnLst>
+              <a:cxn ang="0">
+                <a:pos x="connsiteX0" y="connsiteY0"/>
+              </a:cxn>
+              <a:cxn ang="0">
+                <a:pos x="connsiteX1" y="connsiteY1"/>
+              </a:cxn>
+              <a:cxn ang="0">
+                <a:pos x="connsiteX2" y="connsiteY2"/>
+              </a:cxn>
+              <a:cxn ang="0">
+                <a:pos x="connsiteX3" y="connsiteY3"/>
+              </a:cxn>
+              <a:cxn ang="0">
+                <a:pos x="connsiteX4" y="connsiteY4"/>
+              </a:cxn>
+              <a:cxn ang="0">
+                <a:pos x="connsiteX5" y="connsiteY5"/>
+              </a:cxn>
+              <a:cxn ang="0">
+                <a:pos x="connsiteX6" y="connsiteY6"/>
+              </a:cxn>
+            </a:cxnLst>
+            <a:rect l="l" t="t" r="r" b="b"/>
+            <a:pathLst>
+              <a:path w="3273238" h="3383891">
+                <a:moveTo>
+                  <a:pt x="122841" y="0"/>
+                </a:moveTo>
+                <a:lnTo>
+                  <a:pt x="3273238" y="0"/>
+                </a:lnTo>
+                <a:lnTo>
+                  <a:pt x="3273238" y="3291335"/>
+                </a:lnTo>
+                <a:lnTo>
+                  <a:pt x="3118338" y="3331164"/>
+                </a:lnTo>
+                <a:cubicBezTo>
+                  <a:pt x="2949390" y="3365736"/>
+                  <a:pt x="2774463" y="3383891"/>
+                  <a:pt x="2595295" y="3383891"/>
+                </a:cubicBezTo>
+                <a:cubicBezTo>
+                  <a:pt x="1161953" y="3383891"/>
+                  <a:pt x="0" y="2221938"/>
+                  <a:pt x="0" y="788596"/>
+                </a:cubicBezTo>
+                <a:cubicBezTo>
+                  <a:pt x="0" y="519845"/>
+                  <a:pt x="40850" y="260634"/>
+                  <a:pt x="116679" y="16835"/>
+                </a:cubicBezTo>
+                <a:close/>
+              </a:path>
+            </a:pathLst>
+          </a:custGeom>
+          <a:solidFill>
+            <a:schemeClr val="tx1"/>
+          </a:solidFill>
+          <a:ln>
+            <a:noFill/>
+          </a:ln>
+        </p:spPr>
+        <p:style>
+          <a:lnRef idx="2">
+            <a:schemeClr val="accent1">
+              <a:shade val="50000"/>
+            </a:schemeClr>
+          </a:lnRef>
+          <a:fillRef idx="1">
+            <a:schemeClr val="accent1"/>
+          </a:fillRef>
+          <a:effectRef idx="0">
+            <a:schemeClr val="accent1"/>
+          </a:effectRef>
+          <a:fontRef idx="minor">
+            <a:schemeClr val="lt1"/>
+          </a:fontRef>
+        </p:style>
+        <p:txBody>
+          <a:bodyPr wrap="square" rtlCol="0" anchor="ctr">
+            <a:noAutofit/>
+          </a:bodyPr>
+          <a:lstStyle/>
+          <a:p>
+            <a:pPr algn="ctr"/>
+            <a:endParaRPr lang="en-US"/>
+          </a:p>
+        </p:txBody>
+      </p:sp>
+      <p:sp>
+        <p:nvSpPr>
+          <p:cNvPr id="29" name="Freeform: Shape 28">
+            <a:extLst>
+              <a:ext uri="{FF2B5EF4-FFF2-40B4-BE49-F238E27FC236}">
+                <a16:creationId xmlns:a16="http://schemas.microsoft.com/office/drawing/2014/main" id="{0D14DB62-3EB3-452E-89EE-30B0CDB0C8F4}"/>
+              </a:ext>
+              <a:ext uri="{C183D7F6-B498-43B3-948B-1728B52AA6E4}">
+                <adec:decorative xmlns:adec="http://schemas.microsoft.com/office/drawing/2017/decorative" val="1"/>
+              </a:ext>
+            </a:extLst>
+          </p:cNvPr>
+          <p:cNvSpPr>
+            <a:spLocks noGrp="1" noRot="1" noChangeAspect="1" noMove="1" noResize="1" noEditPoints="1" noAdjustHandles="1" noChangeArrowheads="1" noChangeShapeType="1" noTextEdit="1"/>
+          </p:cNvSpPr>
+          <p:nvPr>
+            <p:extLst>
+              <p:ext uri="{386F3935-93C4-4BCD-93E2-E3B085C9AB24}">
+                <p16:designElem xmlns:p16="http://schemas.microsoft.com/office/powerpoint/2015/main" val="1"/>
+              </p:ext>
+            </p:extLst>
+          </p:nvPr>
+        </p:nvSpPr>
+        <p:spPr>
+          <a:xfrm>
+            <a:off x="9363236" y="4071322"/>
+            <a:ext cx="2828765" cy="2786678"/>
+          </a:xfrm>
+          <a:custGeom>
+            <a:avLst/>
+            <a:gdLst>
+              <a:gd name="connsiteX0" fmla="*/ 1888236 w 2828765"/>
+              <a:gd name="connsiteY0" fmla="*/ 0 h 2786678"/>
+              <a:gd name="connsiteX1" fmla="*/ 2788281 w 2828765"/>
+              <a:gd name="connsiteY1" fmla="*/ 227900 h 2786678"/>
+              <a:gd name="connsiteX2" fmla="*/ 2828765 w 2828765"/>
+              <a:gd name="connsiteY2" fmla="*/ 252495 h 2786678"/>
+              <a:gd name="connsiteX3" fmla="*/ 2828765 w 2828765"/>
+              <a:gd name="connsiteY3" fmla="*/ 2786678 h 2786678"/>
+              <a:gd name="connsiteX4" fmla="*/ 227128 w 2828765"/>
+              <a:gd name="connsiteY4" fmla="*/ 2786678 h 2786678"/>
+              <a:gd name="connsiteX5" fmla="*/ 148387 w 2828765"/>
+              <a:gd name="connsiteY5" fmla="*/ 2623223 h 2786678"/>
+              <a:gd name="connsiteX6" fmla="*/ 0 w 2828765"/>
+              <a:gd name="connsiteY6" fmla="*/ 1888236 h 2786678"/>
+              <a:gd name="connsiteX7" fmla="*/ 1888236 w 2828765"/>
+              <a:gd name="connsiteY7" fmla="*/ 0 h 2786678"/>
+            </a:gdLst>
+            <a:ahLst/>
+            <a:cxnLst>
+              <a:cxn ang="0">
+                <a:pos x="connsiteX0" y="connsiteY0"/>
+              </a:cxn>
+              <a:cxn ang="0">
+                <a:pos x="connsiteX1" y="connsiteY1"/>
+              </a:cxn>
+              <a:cxn ang="0">
+                <a:pos x="connsiteX2" y="connsiteY2"/>
+              </a:cxn>
+              <a:cxn ang="0">
+                <a:pos x="connsiteX3" y="connsiteY3"/>
+              </a:cxn>
+              <a:cxn ang="0">
+                <a:pos x="connsiteX4" y="connsiteY4"/>
+              </a:cxn>
+              <a:cxn ang="0">
+                <a:pos x="connsiteX5" y="connsiteY5"/>
+              </a:cxn>
+              <a:cxn ang="0">
+                <a:pos x="connsiteX6" y="connsiteY6"/>
+              </a:cxn>
+              <a:cxn ang="0">
+                <a:pos x="connsiteX7" y="connsiteY7"/>
+              </a:cxn>
+            </a:cxnLst>
+            <a:rect l="l" t="t" r="r" b="b"/>
+            <a:pathLst>
+              <a:path w="2828765" h="2786678">
+                <a:moveTo>
+                  <a:pt x="1888236" y="0"/>
+                </a:moveTo>
+                <a:cubicBezTo>
+                  <a:pt x="2214125" y="0"/>
+                  <a:pt x="2520731" y="82558"/>
+                  <a:pt x="2788281" y="227900"/>
+                </a:cubicBezTo>
+                <a:lnTo>
+                  <a:pt x="2828765" y="252495"/>
+                </a:lnTo>
+                <a:lnTo>
+                  <a:pt x="2828765" y="2786678"/>
+                </a:lnTo>
+                <a:lnTo>
+                  <a:pt x="227128" y="2786678"/>
+                </a:lnTo>
+                <a:lnTo>
+                  <a:pt x="148387" y="2623223"/>
+                </a:lnTo>
+                <a:cubicBezTo>
+                  <a:pt x="52837" y="2397318"/>
+                  <a:pt x="0" y="2148947"/>
+                  <a:pt x="0" y="1888236"/>
+                </a:cubicBezTo>
+                <a:cubicBezTo>
+                  <a:pt x="0" y="845392"/>
+                  <a:pt x="845392" y="0"/>
+                  <a:pt x="1888236" y="0"/>
+                </a:cubicBezTo>
+                <a:close/>
+              </a:path>
+            </a:pathLst>
+          </a:custGeom>
+          <a:solidFill>
+            <a:schemeClr val="tx1"/>
+          </a:solidFill>
+          <a:ln>
+            <a:noFill/>
+          </a:ln>
+        </p:spPr>
+        <p:style>
+          <a:lnRef idx="2">
+            <a:schemeClr val="accent1">
+              <a:shade val="50000"/>
+            </a:schemeClr>
+          </a:lnRef>
+          <a:fillRef idx="1">
+            <a:schemeClr val="accent1"/>
+          </a:fillRef>
+          <a:effectRef idx="0">
+            <a:schemeClr val="accent1"/>
+          </a:effectRef>
+          <a:fontRef idx="minor">
+            <a:schemeClr val="lt1"/>
+          </a:fontRef>
+        </p:style>
+        <p:txBody>
+          <a:bodyPr wrap="square" rtlCol="0" anchor="ctr">
+            <a:noAutofit/>
+          </a:bodyPr>
+          <a:lstStyle/>
+          <a:p>
+            <a:pPr algn="ctr"/>
+            <a:endParaRPr lang="en-US"/>
+          </a:p>
+        </p:txBody>
+      </p:sp>
+      <p:sp>
+        <p:nvSpPr>
+          <p:cNvPr id="31" name="Freeform: Shape 30">
+            <a:extLst>
+              <a:ext uri="{FF2B5EF4-FFF2-40B4-BE49-F238E27FC236}">
+                <a16:creationId xmlns:a16="http://schemas.microsoft.com/office/drawing/2014/main" id="{CB14CE1B-4BC5-4EF2-BE3D-05E4F580B3DB}"/>
+              </a:ext>
+              <a:ext uri="{C183D7F6-B498-43B3-948B-1728B52AA6E4}">
+                <adec:decorative xmlns:adec="http://schemas.microsoft.com/office/drawing/2017/decorative" val="1"/>
+              </a:ext>
+            </a:extLst>
+          </p:cNvPr>
+          <p:cNvSpPr>
+            <a:spLocks noGrp="1" noRot="1" noChangeAspect="1" noMove="1" noResize="1" noEditPoints="1" noAdjustHandles="1" noChangeArrowheads="1" noChangeShapeType="1" noTextEdit="1"/>
+          </p:cNvSpPr>
+          <p:nvPr>
+            <p:extLst>
+              <p:ext uri="{386F3935-93C4-4BCD-93E2-E3B085C9AB24}">
+                <p16:designElem xmlns:p16="http://schemas.microsoft.com/office/powerpoint/2015/main" val="1"/>
+              </p:ext>
+            </p:extLst>
+          </p:nvPr>
+        </p:nvSpPr>
+        <p:spPr>
+          <a:xfrm>
+            <a:off x="9199331" y="3907418"/>
+            <a:ext cx="2992669" cy="2950582"/>
+          </a:xfrm>
+          <a:custGeom>
+            <a:avLst/>
+            <a:gdLst>
+              <a:gd name="connsiteX0" fmla="*/ 2052140 w 2992669"/>
+              <a:gd name="connsiteY0" fmla="*/ 0 h 2950582"/>
+              <a:gd name="connsiteX1" fmla="*/ 2850926 w 2992669"/>
+              <a:gd name="connsiteY1" fmla="*/ 161267 h 2950582"/>
+              <a:gd name="connsiteX2" fmla="*/ 2992669 w 2992669"/>
+              <a:gd name="connsiteY2" fmla="*/ 229549 h 2950582"/>
+              <a:gd name="connsiteX3" fmla="*/ 2992669 w 2992669"/>
+              <a:gd name="connsiteY3" fmla="*/ 2950582 h 2950582"/>
+              <a:gd name="connsiteX4" fmla="*/ 209274 w 2992669"/>
+              <a:gd name="connsiteY4" fmla="*/ 2950582 h 2950582"/>
+              <a:gd name="connsiteX5" fmla="*/ 161267 w 2992669"/>
+              <a:gd name="connsiteY5" fmla="*/ 2850926 h 2950582"/>
+              <a:gd name="connsiteX6" fmla="*/ 0 w 2992669"/>
+              <a:gd name="connsiteY6" fmla="*/ 2052140 h 2950582"/>
+              <a:gd name="connsiteX7" fmla="*/ 2052140 w 2992669"/>
+              <a:gd name="connsiteY7" fmla="*/ 0 h 2950582"/>
+            </a:gdLst>
+            <a:ahLst/>
+            <a:cxnLst>
+              <a:cxn ang="0">
+                <a:pos x="connsiteX0" y="connsiteY0"/>
+              </a:cxn>
+              <a:cxn ang="0">
+                <a:pos x="connsiteX1" y="connsiteY1"/>
+              </a:cxn>
+              <a:cxn ang="0">
+                <a:pos x="connsiteX2" y="connsiteY2"/>
+              </a:cxn>
+              <a:cxn ang="0">
+                <a:pos x="connsiteX3" y="connsiteY3"/>
+              </a:cxn>
+              <a:cxn ang="0">
+                <a:pos x="connsiteX4" y="connsiteY4"/>
+              </a:cxn>
+              <a:cxn ang="0">
+                <a:pos x="connsiteX5" y="connsiteY5"/>
+              </a:cxn>
+              <a:cxn ang="0">
+                <a:pos x="connsiteX6" y="connsiteY6"/>
+              </a:cxn>
+              <a:cxn ang="0">
+                <a:pos x="connsiteX7" y="connsiteY7"/>
+              </a:cxn>
+            </a:cxnLst>
+            <a:rect l="l" t="t" r="r" b="b"/>
+            <a:pathLst>
+              <a:path w="2992669" h="2950582">
+                <a:moveTo>
+                  <a:pt x="2052140" y="0"/>
+                </a:moveTo>
+                <a:cubicBezTo>
+                  <a:pt x="2335482" y="0"/>
+                  <a:pt x="2605411" y="57424"/>
+                  <a:pt x="2850926" y="161267"/>
+                </a:cubicBezTo>
+                <a:lnTo>
+                  <a:pt x="2992669" y="229549"/>
+                </a:lnTo>
+                <a:lnTo>
+                  <a:pt x="2992669" y="2950582"/>
+                </a:lnTo>
+                <a:lnTo>
+                  <a:pt x="209274" y="2950582"/>
+                </a:lnTo>
+                <a:lnTo>
+                  <a:pt x="161267" y="2850926"/>
+                </a:lnTo>
+                <a:cubicBezTo>
+                  <a:pt x="57423" y="2605411"/>
+                  <a:pt x="0" y="2335482"/>
+                  <a:pt x="0" y="2052140"/>
+                </a:cubicBezTo>
+                <a:cubicBezTo>
+                  <a:pt x="0" y="918774"/>
+                  <a:pt x="918774" y="0"/>
+                  <a:pt x="2052140" y="0"/>
+                </a:cubicBezTo>
+                <a:close/>
+              </a:path>
+            </a:pathLst>
+          </a:custGeom>
+          <a:solidFill>
+            <a:srgbClr val="FFFFFF">
+              <a:alpha val="80000"/>
+            </a:srgbClr>
+          </a:solidFill>
+          <a:ln>
+            <a:noFill/>
+          </a:ln>
+        </p:spPr>
+        <p:style>
+          <a:lnRef idx="2">
+            <a:schemeClr val="accent1">
+              <a:shade val="50000"/>
+            </a:schemeClr>
+          </a:lnRef>
+          <a:fillRef idx="1">
+            <a:schemeClr val="accent1"/>
+          </a:fillRef>
+          <a:effectRef idx="0">
+            <a:schemeClr val="accent1"/>
+          </a:effectRef>
+          <a:fontRef idx="minor">
+            <a:schemeClr val="lt1"/>
+          </a:fontRef>
+        </p:style>
+        <p:txBody>
+          <a:bodyPr wrap="square" rtlCol="0" anchor="ctr">
+            <a:noAutofit/>
+          </a:bodyPr>
+          <a:lstStyle/>
+          <a:p>
+            <a:pPr marL="0" marR="0" lvl="0" indent="0" algn="ctr" defTabSz="914400" rtl="0" eaLnBrk="1" fontAlgn="auto" latinLnBrk="0" hangingPunct="1">
+              <a:lnSpc>
+                <a:spcPct val="100000"/>
+              </a:lnSpc>
+              <a:spcBef>
+                <a:spcPts val="0"/>
+              </a:spcBef>
+              <a:spcAft>
+                <a:spcPts val="0"/>
+              </a:spcAft>
+              <a:buClrTx/>
+              <a:buSzTx/>
+              <a:buFontTx/>
+              <a:buNone/>
+              <a:tabLst/>
+              <a:defRPr/>
+            </a:pPr>
+            <a:endParaRPr kumimoji="0" lang="en-US" sz="1800" b="0" i="0" u="none" strike="noStrike" kern="1200" cap="none" spc="0" normalizeH="0" baseline="0" noProof="0">
+              <a:ln>
+                <a:noFill/>
+              </a:ln>
+              <a:solidFill>
+                <a:prstClr val="white"/>
+              </a:solidFill>
+              <a:effectLst/>
+              <a:uLnTx/>
+              <a:uFillTx/>
+              <a:latin typeface="Calibri" panose="020F0502020204030204"/>
+              <a:ea typeface="+mn-ea"/>
+              <a:cs typeface="+mn-cs"/>
+            </a:endParaRPr>
+          </a:p>
+        </p:txBody>
+      </p:sp>
+      <p:pic>
+        <p:nvPicPr>
+          <p:cNvPr id="8" name="Picture 7">
+            <a:extLst>
+              <a:ext uri="{FF2B5EF4-FFF2-40B4-BE49-F238E27FC236}">
+                <a16:creationId xmlns:a16="http://schemas.microsoft.com/office/drawing/2014/main" id="{C8903EF6-5966-4609-A70E-8304F4862E1A}"/>
+              </a:ext>
+            </a:extLst>
+          </p:cNvPr>
+          <p:cNvPicPr>
+            <a:picLocks noChangeAspect="1"/>
+          </p:cNvPicPr>
+          <p:nvPr/>
+        </p:nvPicPr>
+        <p:blipFill>
+          <a:blip r:embed="rId3">
+            <a:extLst>
+              <a:ext uri="{28A0092B-C50C-407E-A947-70E740481C1C}">
+                <a14:useLocalDpi xmlns:a14="http://schemas.microsoft.com/office/drawing/2010/main" val="0"/>
+              </a:ext>
+            </a:extLst>
+          </a:blip>
+          <a:stretch>
+            <a:fillRect/>
+          </a:stretch>
+        </p:blipFill>
+        <p:spPr>
+          <a:xfrm>
+            <a:off x="5916241" y="1388877"/>
+            <a:ext cx="1692946" cy="1692946"/>
+          </a:xfrm>
+          <a:prstGeom prst="rect">
+            <a:avLst/>
+          </a:prstGeom>
+        </p:spPr>
+      </p:pic>
+      <p:pic>
+        <p:nvPicPr>
+          <p:cNvPr id="5" name="Picture 4">
+            <a:extLst>
+              <a:ext uri="{FF2B5EF4-FFF2-40B4-BE49-F238E27FC236}">
+                <a16:creationId xmlns:a16="http://schemas.microsoft.com/office/drawing/2014/main" id="{91F82DD0-5EB9-47A0-A2BE-F0FEA56352A8}"/>
+              </a:ext>
+            </a:extLst>
+          </p:cNvPr>
+          <p:cNvPicPr>
+            <a:picLocks noChangeAspect="1"/>
+          </p:cNvPicPr>
+          <p:nvPr/>
+        </p:nvPicPr>
+        <p:blipFill>
+          <a:blip r:embed="rId4"/>
+          <a:stretch>
+            <a:fillRect/>
+          </a:stretch>
+        </p:blipFill>
+        <p:spPr>
+          <a:xfrm>
+            <a:off x="150640" y="3796615"/>
+            <a:ext cx="2448784" cy="1903930"/>
+          </a:xfrm>
+          <a:prstGeom prst="rect">
+            <a:avLst/>
+          </a:prstGeom>
+        </p:spPr>
+      </p:pic>
+      <p:pic>
+        <p:nvPicPr>
+          <p:cNvPr id="10" name="Picture 9" descr="A picture containing text, electronics, circuit&#10;&#10;Description automatically generated">
+            <a:extLst>
+              <a:ext uri="{FF2B5EF4-FFF2-40B4-BE49-F238E27FC236}">
+                <a16:creationId xmlns:a16="http://schemas.microsoft.com/office/drawing/2014/main" id="{C5931FFC-6D15-4444-9937-6552C589F7D2}"/>
+              </a:ext>
+            </a:extLst>
+          </p:cNvPr>
+          <p:cNvPicPr>
+            <a:picLocks noChangeAspect="1"/>
+          </p:cNvPicPr>
+          <p:nvPr/>
+        </p:nvPicPr>
+        <p:blipFill>
+          <a:blip r:embed="rId5">
+            <a:extLst>
+              <a:ext uri="{28A0092B-C50C-407E-A947-70E740481C1C}">
+                <a14:useLocalDpi xmlns:a14="http://schemas.microsoft.com/office/drawing/2010/main" val="0"/>
+              </a:ext>
+            </a:extLst>
+          </a:blip>
+          <a:stretch>
+            <a:fillRect/>
+          </a:stretch>
+        </p:blipFill>
+        <p:spPr>
+          <a:xfrm>
+            <a:off x="9633437" y="157701"/>
+            <a:ext cx="2558562" cy="2558562"/>
+          </a:xfrm>
+          <a:prstGeom prst="rect">
+            <a:avLst/>
+          </a:prstGeom>
+        </p:spPr>
+      </p:pic>
+      <p:pic>
+        <p:nvPicPr>
+          <p:cNvPr id="4" name="Picture 3" descr="A picture containing seat&#10;&#10;Description automatically generated">
+            <a:extLst>
+              <a:ext uri="{FF2B5EF4-FFF2-40B4-BE49-F238E27FC236}">
+                <a16:creationId xmlns:a16="http://schemas.microsoft.com/office/drawing/2014/main" id="{4BF19524-2D27-4FE6-8A11-02A083FB6622}"/>
+              </a:ext>
+            </a:extLst>
+          </p:cNvPr>
+          <p:cNvPicPr>
+            <a:picLocks noChangeAspect="1"/>
+          </p:cNvPicPr>
+          <p:nvPr/>
+        </p:nvPicPr>
+        <p:blipFill>
+          <a:blip r:embed="rId6">
+            <a:extLst>
+              <a:ext uri="{28A0092B-C50C-407E-A947-70E740481C1C}">
+                <a14:useLocalDpi xmlns:a14="http://schemas.microsoft.com/office/drawing/2010/main" val="0"/>
+              </a:ext>
+            </a:extLst>
+          </a:blip>
+          <a:stretch>
+            <a:fillRect/>
+          </a:stretch>
+        </p:blipFill>
+        <p:spPr>
+          <a:xfrm>
+            <a:off x="10264118" y="4853423"/>
+            <a:ext cx="1777242" cy="1777242"/>
+          </a:xfrm>
+          <a:prstGeom prst="rect">
+            <a:avLst/>
+          </a:prstGeom>
+        </p:spPr>
+      </p:pic>
     </p:spTree>
     <p:extLst>
       <p:ext uri="{BB962C8B-B14F-4D97-AF65-F5344CB8AC3E}">
         <p14:creationId xmlns:p14="http://schemas.microsoft.com/office/powerpoint/2010/main" val="3819788902"/>
+      </p:ext>
+    </p:extLst>
+  </p:cSld>
+  <p:clrMapOvr>
+    <a:overrideClrMapping bg1="dk1" tx1="lt1" bg2="dk2" tx2="lt2" accent1="accent1" accent2="accent2" accent3="accent3" accent4="accent4" accent5="accent5" accent6="accent6" hlink="hlink" folHlink="folHlink"/>
+  </p:clrMapOvr>
+</p:sld>
+</file>
+
+<file path=ppt/slides/slide2.xml><?xml version="1.0" encoding="utf-8"?>
+<p:sld xmlns:a="http://schemas.openxmlformats.org/drawingml/2006/main" xmlns:r="http://schemas.openxmlformats.org/officeDocument/2006/relationships" xmlns:p="http://schemas.openxmlformats.org/presentationml/2006/main">
+  <p:cSld>
+    <p:spTree>
+      <p:nvGrpSpPr>
+        <p:cNvPr id="1" name=""/>
+        <p:cNvGrpSpPr/>
+        <p:nvPr/>
+      </p:nvGrpSpPr>
+      <p:grpSpPr>
+        <a:xfrm>
+          <a:off x="0" y="0"/>
+          <a:ext cx="0" cy="0"/>
+          <a:chOff x="0" y="0"/>
+          <a:chExt cx="0" cy="0"/>
+        </a:xfrm>
+      </p:grpSpPr>
+      <p:pic>
+        <p:nvPicPr>
+          <p:cNvPr id="4" name="Picture 3" descr="A picture containing graphical user interface&#10;&#10;Description automatically generated">
+            <a:extLst>
+              <a:ext uri="{FF2B5EF4-FFF2-40B4-BE49-F238E27FC236}">
+                <a16:creationId xmlns:a16="http://schemas.microsoft.com/office/drawing/2014/main" id="{B92C718A-3E9E-4F00-AAD3-6FACF11CC608}"/>
+              </a:ext>
+            </a:extLst>
+          </p:cNvPr>
+          <p:cNvPicPr>
+            <a:picLocks noChangeAspect="1"/>
+          </p:cNvPicPr>
+          <p:nvPr/>
+        </p:nvPicPr>
+        <p:blipFill>
+          <a:blip r:embed="rId2">
+            <a:extLst>
+              <a:ext uri="{28A0092B-C50C-407E-A947-70E740481C1C}">
+                <a14:useLocalDpi xmlns:a14="http://schemas.microsoft.com/office/drawing/2010/main" val="0"/>
+              </a:ext>
+            </a:extLst>
+          </a:blip>
+          <a:stretch>
+            <a:fillRect/>
+          </a:stretch>
+        </p:blipFill>
+        <p:spPr>
+          <a:xfrm>
+            <a:off x="3131880" y="662781"/>
+            <a:ext cx="7583415" cy="5899897"/>
+          </a:xfrm>
+          <a:prstGeom prst="rect">
+            <a:avLst/>
+          </a:prstGeom>
+        </p:spPr>
+      </p:pic>
+      <p:sp>
+        <p:nvSpPr>
+          <p:cNvPr id="5" name="Rectangle 4">
+            <a:extLst>
+              <a:ext uri="{FF2B5EF4-FFF2-40B4-BE49-F238E27FC236}">
+                <a16:creationId xmlns:a16="http://schemas.microsoft.com/office/drawing/2014/main" id="{F9B3D7BE-C6EA-4A76-86B7-66D530DB257B}"/>
+              </a:ext>
+            </a:extLst>
+          </p:cNvPr>
+          <p:cNvSpPr/>
+          <p:nvPr/>
+        </p:nvSpPr>
+        <p:spPr>
+          <a:xfrm>
+            <a:off x="-87923" y="0"/>
+            <a:ext cx="12279923" cy="6858000"/>
+          </a:xfrm>
+          <a:prstGeom prst="rect">
+            <a:avLst/>
+          </a:prstGeom>
+          <a:gradFill>
+            <a:gsLst>
+              <a:gs pos="41000">
+                <a:schemeClr val="tx1">
+                  <a:alpha val="66000"/>
+                </a:schemeClr>
+              </a:gs>
+              <a:gs pos="0">
+                <a:schemeClr val="tx1">
+                  <a:lumMod val="95000"/>
+                  <a:lumOff val="5000"/>
+                </a:schemeClr>
+              </a:gs>
+              <a:gs pos="100000">
+                <a:schemeClr val="bg1">
+                  <a:alpha val="0"/>
+                </a:schemeClr>
+              </a:gs>
+              <a:gs pos="100000">
+                <a:schemeClr val="accent1">
+                  <a:lumMod val="30000"/>
+                  <a:lumOff val="70000"/>
+                </a:schemeClr>
+              </a:gs>
+            </a:gsLst>
+            <a:lin ang="0" scaled="0"/>
+          </a:gradFill>
+        </p:spPr>
+        <p:style>
+          <a:lnRef idx="2">
+            <a:schemeClr val="accent1">
+              <a:shade val="50000"/>
+            </a:schemeClr>
+          </a:lnRef>
+          <a:fillRef idx="1">
+            <a:schemeClr val="accent1"/>
+          </a:fillRef>
+          <a:effectRef idx="0">
+            <a:schemeClr val="accent1"/>
+          </a:effectRef>
+          <a:fontRef idx="minor">
+            <a:schemeClr val="lt1"/>
+          </a:fontRef>
+        </p:style>
+        <p:txBody>
+          <a:bodyPr rtlCol="0" anchor="ctr"/>
+          <a:lstStyle/>
+          <a:p>
+            <a:pPr algn="ctr"/>
+            <a:endParaRPr lang="en-US"/>
+          </a:p>
+        </p:txBody>
+      </p:sp>
+      <p:sp>
+        <p:nvSpPr>
+          <p:cNvPr id="2" name="Title 1">
+            <a:extLst>
+              <a:ext uri="{FF2B5EF4-FFF2-40B4-BE49-F238E27FC236}">
+                <a16:creationId xmlns:a16="http://schemas.microsoft.com/office/drawing/2014/main" id="{AC63A9D7-3BB4-46A0-89BE-6C2FA293120D}"/>
+              </a:ext>
+            </a:extLst>
+          </p:cNvPr>
+          <p:cNvSpPr>
+            <a:spLocks noGrp="1"/>
+          </p:cNvSpPr>
+          <p:nvPr>
+            <p:ph type="title"/>
+          </p:nvPr>
+        </p:nvSpPr>
+        <p:spPr>
+          <a:xfrm>
+            <a:off x="199696" y="0"/>
+            <a:ext cx="10315903" cy="1325563"/>
+          </a:xfrm>
+        </p:spPr>
+        <p:txBody>
+          <a:bodyPr/>
+          <a:lstStyle/>
+          <a:p>
+            <a:r>
+              <a:rPr lang="en-GB" dirty="0">
+                <a:solidFill>
+                  <a:schemeClr val="bg1"/>
+                </a:solidFill>
+              </a:rPr>
+              <a:t>Arduino Starter Kit</a:t>
+            </a:r>
+            <a:endParaRPr lang="en-US" dirty="0">
+              <a:solidFill>
+                <a:schemeClr val="bg1"/>
+              </a:solidFill>
+            </a:endParaRPr>
+          </a:p>
+        </p:txBody>
+      </p:sp>
+    </p:spTree>
+    <p:extLst>
+      <p:ext uri="{BB962C8B-B14F-4D97-AF65-F5344CB8AC3E}">
+        <p14:creationId xmlns:p14="http://schemas.microsoft.com/office/powerpoint/2010/main" val="2529106279"/>
       </p:ext>
     </p:extLst>
   </p:cSld>
@@ -3387,42 +5176,42 @@
 <file path=ppt/theme/theme1.xml><?xml version="1.0" encoding="utf-8"?>
 <a:theme xmlns:a="http://schemas.openxmlformats.org/drawingml/2006/main" name="Office Theme">
   <a:themeElements>
-    <a:clrScheme name="Office">
+    <a:clrScheme name="Marquee">
       <a:dk1>
-        <a:sysClr val="windowText" lastClr="000000"/>
+        <a:srgbClr val="000000"/>
       </a:dk1>
       <a:lt1>
         <a:sysClr val="window" lastClr="FFFFFF"/>
       </a:lt1>
       <a:dk2>
-        <a:srgbClr val="44546A"/>
+        <a:srgbClr val="5E5E5E"/>
       </a:dk2>
       <a:lt2>
-        <a:srgbClr val="E7E6E6"/>
+        <a:srgbClr val="DDDDDD"/>
       </a:lt2>
       <a:accent1>
-        <a:srgbClr val="4472C4"/>
+        <a:srgbClr val="418AB3"/>
       </a:accent1>
       <a:accent2>
-        <a:srgbClr val="ED7D31"/>
+        <a:srgbClr val="A6B727"/>
       </a:accent2>
       <a:accent3>
-        <a:srgbClr val="A5A5A5"/>
+        <a:srgbClr val="F69200"/>
       </a:accent3>
       <a:accent4>
-        <a:srgbClr val="FFC000"/>
+        <a:srgbClr val="838383"/>
       </a:accent4>
       <a:accent5>
-        <a:srgbClr val="5B9BD5"/>
+        <a:srgbClr val="FEC306"/>
       </a:accent5>
       <a:accent6>
-        <a:srgbClr val="70AD47"/>
+        <a:srgbClr val="DF5327"/>
       </a:accent6>
       <a:hlink>
-        <a:srgbClr val="0563C1"/>
+        <a:srgbClr val="F59E00"/>
       </a:hlink>
       <a:folHlink>
-        <a:srgbClr val="954F72"/>
+        <a:srgbClr val="B2B2B2"/>
       </a:folHlink>
     </a:clrScheme>
     <a:fontScheme name="Office">

</xml_diff>

<commit_message>
Updated schematic and presentation
</commit_message>
<xml_diff>
--- a/docs/Teams Sucks Presentation.pptx
+++ b/docs/Teams Sucks Presentation.pptx
@@ -10,9 +10,9 @@
   <p:sldIdLst>
     <p:sldId id="259" r:id="rId2"/>
     <p:sldId id="261" r:id="rId3"/>
-    <p:sldId id="264" r:id="rId4"/>
-    <p:sldId id="265" r:id="rId5"/>
-    <p:sldId id="269" r:id="rId6"/>
+    <p:sldId id="270" r:id="rId4"/>
+    <p:sldId id="264" r:id="rId5"/>
+    <p:sldId id="265" r:id="rId6"/>
     <p:sldId id="266" r:id="rId7"/>
     <p:sldId id="267" r:id="rId8"/>
     <p:sldId id="268" r:id="rId9"/>
@@ -1107,6 +1107,11 @@
           <a:lstStyle>
             <a:lvl1pPr>
               <a:defRPr b="1">
+                <a:ln>
+                  <a:solidFill>
+                    <a:schemeClr val="bg1"/>
+                  </a:solidFill>
+                </a:ln>
                 <a:solidFill>
                   <a:srgbClr val="F67D5E"/>
                 </a:solidFill>
@@ -5260,7 +5265,7 @@
           <p:cNvPr id="2" name="Title 1">
             <a:extLst>
               <a:ext uri="{FF2B5EF4-FFF2-40B4-BE49-F238E27FC236}">
-                <a16:creationId xmlns:a16="http://schemas.microsoft.com/office/drawing/2014/main" id="{948833DA-25E0-42A7-8BDC-D4D59936CFBF}"/>
+                <a16:creationId xmlns:a16="http://schemas.microsoft.com/office/drawing/2014/main" id="{B320D08F-CEB3-4775-9265-17CE46531699}"/>
               </a:ext>
             </a:extLst>
           </p:cNvPr>
@@ -5278,18 +5283,355 @@
           <a:p>
             <a:r>
               <a:rPr lang="en-GB" dirty="0"/>
-              <a:t>Hardware - Schematic</a:t>
-            </a:r>
-            <a:endParaRPr lang="en-US" dirty="0"/>
-          </a:p>
-        </p:txBody>
-      </p:sp>
-      <p:sp>
-        <p:nvSpPr>
-          <p:cNvPr id="3" name="Content Placeholder 2">
-            <a:extLst>
-              <a:ext uri="{FF2B5EF4-FFF2-40B4-BE49-F238E27FC236}">
-                <a16:creationId xmlns:a16="http://schemas.microsoft.com/office/drawing/2014/main" id="{39F62217-19FE-4D04-943A-11B8C29CDE95}"/>
+              <a:t>Hardware - Microcontroller</a:t>
+            </a:r>
+          </a:p>
+        </p:txBody>
+      </p:sp>
+      <p:pic>
+        <p:nvPicPr>
+          <p:cNvPr id="1026" name="Picture 2" descr="ARDUINO NANO: Arduino Nano V3, ATmega 328, Mini USB at ...">
+            <a:extLst>
+              <a:ext uri="{FF2B5EF4-FFF2-40B4-BE49-F238E27FC236}">
+                <a16:creationId xmlns:a16="http://schemas.microsoft.com/office/drawing/2014/main" id="{13B579BB-4717-4E16-9F64-469A2988AC76}"/>
+              </a:ext>
+            </a:extLst>
+          </p:cNvPr>
+          <p:cNvPicPr>
+            <a:picLocks noChangeAspect="1" noChangeArrowheads="1"/>
+          </p:cNvPicPr>
+          <p:nvPr/>
+        </p:nvPicPr>
+        <p:blipFill>
+          <a:blip r:embed="rId2">
+            <a:extLst>
+              <a:ext uri="{28A0092B-C50C-407E-A947-70E740481C1C}">
+                <a14:useLocalDpi xmlns:a14="http://schemas.microsoft.com/office/drawing/2010/main" val="0"/>
+              </a:ext>
+            </a:extLst>
+          </a:blip>
+          <a:srcRect/>
+          <a:stretch>
+            <a:fillRect/>
+          </a:stretch>
+        </p:blipFill>
+        <p:spPr bwMode="auto">
+          <a:xfrm>
+            <a:off x="8059677" y="1558863"/>
+            <a:ext cx="3140630" cy="2454771"/>
+          </a:xfrm>
+          <a:prstGeom prst="rect">
+            <a:avLst/>
+          </a:prstGeom>
+          <a:noFill/>
+          <a:extLst>
+            <a:ext uri="{909E8E84-426E-40DD-AFC4-6F175D3DCCD1}">
+              <a14:hiddenFill xmlns:a14="http://schemas.microsoft.com/office/drawing/2010/main">
+                <a:solidFill>
+                  <a:srgbClr val="FFFFFF"/>
+                </a:solidFill>
+              </a14:hiddenFill>
+            </a:ext>
+          </a:extLst>
+        </p:spPr>
+      </p:pic>
+      <p:pic>
+        <p:nvPicPr>
+          <p:cNvPr id="5" name="Picture 4">
+            <a:extLst>
+              <a:ext uri="{FF2B5EF4-FFF2-40B4-BE49-F238E27FC236}">
+                <a16:creationId xmlns:a16="http://schemas.microsoft.com/office/drawing/2014/main" id="{A758C1BC-BB2C-45C4-A576-65201AD6B7D7}"/>
+              </a:ext>
+            </a:extLst>
+          </p:cNvPr>
+          <p:cNvPicPr>
+            <a:picLocks noChangeAspect="1"/>
+          </p:cNvPicPr>
+          <p:nvPr/>
+        </p:nvPicPr>
+        <p:blipFill>
+          <a:blip r:embed="rId3"/>
+          <a:stretch>
+            <a:fillRect/>
+          </a:stretch>
+        </p:blipFill>
+        <p:spPr>
+          <a:xfrm>
+            <a:off x="541134" y="1875518"/>
+            <a:ext cx="5641415" cy="4452730"/>
+          </a:xfrm>
+          <a:prstGeom prst="rect">
+            <a:avLst/>
+          </a:prstGeom>
+        </p:spPr>
+      </p:pic>
+      <p:sp>
+        <p:nvSpPr>
+          <p:cNvPr id="7" name="Title 1">
+            <a:extLst>
+              <a:ext uri="{FF2B5EF4-FFF2-40B4-BE49-F238E27FC236}">
+                <a16:creationId xmlns:a16="http://schemas.microsoft.com/office/drawing/2014/main" id="{F5F5DE74-E323-4BCE-B539-18EB17E8B4A5}"/>
+              </a:ext>
+            </a:extLst>
+          </p:cNvPr>
+          <p:cNvSpPr txBox="1">
+            <a:spLocks/>
+          </p:cNvSpPr>
+          <p:nvPr/>
+        </p:nvSpPr>
+        <p:spPr>
+          <a:xfrm>
+            <a:off x="454585" y="1085497"/>
+            <a:ext cx="968633" cy="480131"/>
+          </a:xfrm>
+          <a:prstGeom prst="rect">
+            <a:avLst/>
+          </a:prstGeom>
+          <a:solidFill>
+            <a:srgbClr val="03849A"/>
+          </a:solidFill>
+        </p:spPr>
+        <p:txBody>
+          <a:bodyPr vert="horz" wrap="square" lIns="91440" tIns="45720" rIns="91440" bIns="45720" rtlCol="0" anchor="t">
+            <a:spAutoFit/>
+          </a:bodyPr>
+          <a:lstStyle>
+            <a:lvl1pPr algn="ctr" defTabSz="914400" rtl="0" eaLnBrk="1" latinLnBrk="0" hangingPunct="1">
+              <a:lnSpc>
+                <a:spcPct val="90000"/>
+              </a:lnSpc>
+              <a:spcBef>
+                <a:spcPct val="0"/>
+              </a:spcBef>
+              <a:buNone/>
+              <a:defRPr sz="6000" kern="1200">
+                <a:solidFill>
+                  <a:schemeClr val="tx1"/>
+                </a:solidFill>
+                <a:latin typeface="+mj-lt"/>
+                <a:ea typeface="+mj-ea"/>
+                <a:cs typeface="+mj-cs"/>
+              </a:defRPr>
+            </a:lvl1pPr>
+          </a:lstStyle>
+          <a:p>
+            <a:pPr algn="l"/>
+            <a:r>
+              <a:rPr lang="en-GB" sz="2800" dirty="0">
+                <a:solidFill>
+                  <a:schemeClr val="bg1"/>
+                </a:solidFill>
+                <a:latin typeface="Verdana Pro Cond SemiBold" panose="020B0604020202020204" pitchFamily="34" charset="0"/>
+              </a:rPr>
+              <a:t>C++</a:t>
+            </a:r>
+            <a:endParaRPr lang="en-US" sz="2800" dirty="0">
+              <a:solidFill>
+                <a:schemeClr val="bg1"/>
+              </a:solidFill>
+              <a:latin typeface="Verdana Pro Cond SemiBold" panose="020B0604020202020204" pitchFamily="34" charset="0"/>
+            </a:endParaRPr>
+          </a:p>
+        </p:txBody>
+      </p:sp>
+      <p:sp>
+        <p:nvSpPr>
+          <p:cNvPr id="8" name="Title 1">
+            <a:extLst>
+              <a:ext uri="{FF2B5EF4-FFF2-40B4-BE49-F238E27FC236}">
+                <a16:creationId xmlns:a16="http://schemas.microsoft.com/office/drawing/2014/main" id="{65CDEC6D-5AC7-4944-B449-4AF7CC15DAC3}"/>
+              </a:ext>
+            </a:extLst>
+          </p:cNvPr>
+          <p:cNvSpPr txBox="1">
+            <a:spLocks/>
+          </p:cNvSpPr>
+          <p:nvPr/>
+        </p:nvSpPr>
+        <p:spPr>
+          <a:xfrm>
+            <a:off x="7540434" y="1273220"/>
+            <a:ext cx="2404864" cy="480131"/>
+          </a:xfrm>
+          <a:prstGeom prst="rect">
+            <a:avLst/>
+          </a:prstGeom>
+          <a:solidFill>
+            <a:srgbClr val="03849A"/>
+          </a:solidFill>
+        </p:spPr>
+        <p:txBody>
+          <a:bodyPr vert="horz" wrap="square" lIns="91440" tIns="45720" rIns="91440" bIns="45720" rtlCol="0" anchor="t">
+            <a:spAutoFit/>
+          </a:bodyPr>
+          <a:lstStyle>
+            <a:lvl1pPr algn="ctr" defTabSz="914400" rtl="0" eaLnBrk="1" latinLnBrk="0" hangingPunct="1">
+              <a:lnSpc>
+                <a:spcPct val="90000"/>
+              </a:lnSpc>
+              <a:spcBef>
+                <a:spcPct val="0"/>
+              </a:spcBef>
+              <a:buNone/>
+              <a:defRPr sz="6000" kern="1200">
+                <a:solidFill>
+                  <a:schemeClr val="tx1"/>
+                </a:solidFill>
+                <a:latin typeface="+mj-lt"/>
+                <a:ea typeface="+mj-ea"/>
+                <a:cs typeface="+mj-cs"/>
+              </a:defRPr>
+            </a:lvl1pPr>
+          </a:lstStyle>
+          <a:p>
+            <a:pPr algn="l"/>
+            <a:r>
+              <a:rPr lang="en-GB" sz="2800" dirty="0">
+                <a:solidFill>
+                  <a:schemeClr val="bg1"/>
+                </a:solidFill>
+                <a:latin typeface="Verdana Pro Cond SemiBold" panose="020B0604020202020204" pitchFamily="34" charset="0"/>
+              </a:rPr>
+              <a:t>Arduino Nano</a:t>
+            </a:r>
+            <a:endParaRPr lang="en-US" sz="2800" dirty="0">
+              <a:solidFill>
+                <a:schemeClr val="bg1"/>
+              </a:solidFill>
+              <a:latin typeface="Verdana Pro Cond SemiBold" panose="020B0604020202020204" pitchFamily="34" charset="0"/>
+            </a:endParaRPr>
+          </a:p>
+        </p:txBody>
+      </p:sp>
+      <p:sp>
+        <p:nvSpPr>
+          <p:cNvPr id="9" name="TextBox 8">
+            <a:extLst>
+              <a:ext uri="{FF2B5EF4-FFF2-40B4-BE49-F238E27FC236}">
+                <a16:creationId xmlns:a16="http://schemas.microsoft.com/office/drawing/2014/main" id="{522A9DA6-ADC7-4EF9-AD22-7EE1C5860307}"/>
+              </a:ext>
+            </a:extLst>
+          </p:cNvPr>
+          <p:cNvSpPr txBox="1"/>
+          <p:nvPr/>
+        </p:nvSpPr>
+        <p:spPr>
+          <a:xfrm>
+            <a:off x="4756688" y="1987727"/>
+            <a:ext cx="1688283" cy="523220"/>
+          </a:xfrm>
+          <a:prstGeom prst="rect">
+            <a:avLst/>
+          </a:prstGeom>
+          <a:noFill/>
+        </p:spPr>
+        <p:txBody>
+          <a:bodyPr wrap="none" rtlCol="0">
+            <a:spAutoFit/>
+          </a:bodyPr>
+          <a:lstStyle/>
+          <a:p>
+            <a:r>
+              <a:rPr lang="en-GB" sz="2800" b="1" dirty="0">
+                <a:latin typeface="Courier New" panose="02070309020205020404" pitchFamily="49" charset="0"/>
+                <a:cs typeface="Courier New" panose="02070309020205020404" pitchFamily="49" charset="0"/>
+              </a:rPr>
+              <a:t>Compile</a:t>
+            </a:r>
+          </a:p>
+        </p:txBody>
+      </p:sp>
+      <p:sp>
+        <p:nvSpPr>
+          <p:cNvPr id="11" name="TextBox 10">
+            <a:extLst>
+              <a:ext uri="{FF2B5EF4-FFF2-40B4-BE49-F238E27FC236}">
+                <a16:creationId xmlns:a16="http://schemas.microsoft.com/office/drawing/2014/main" id="{59ED4AE1-3093-4E6F-A7CE-D540830BF144}"/>
+              </a:ext>
+            </a:extLst>
+          </p:cNvPr>
+          <p:cNvSpPr txBox="1"/>
+          <p:nvPr/>
+        </p:nvSpPr>
+        <p:spPr>
+          <a:xfrm>
+            <a:off x="5888196" y="5259203"/>
+            <a:ext cx="1473480" cy="523220"/>
+          </a:xfrm>
+          <a:prstGeom prst="rect">
+            <a:avLst/>
+          </a:prstGeom>
+          <a:noFill/>
+        </p:spPr>
+        <p:txBody>
+          <a:bodyPr wrap="none" rtlCol="0">
+            <a:spAutoFit/>
+          </a:bodyPr>
+          <a:lstStyle/>
+          <a:p>
+            <a:r>
+              <a:rPr lang="en-GB" sz="2800" b="1" dirty="0">
+                <a:latin typeface="Courier New" panose="02070309020205020404" pitchFamily="49" charset="0"/>
+                <a:cs typeface="Courier New" panose="02070309020205020404" pitchFamily="49" charset="0"/>
+              </a:rPr>
+              <a:t>Upload</a:t>
+            </a:r>
+          </a:p>
+        </p:txBody>
+      </p:sp>
+      <p:pic>
+        <p:nvPicPr>
+          <p:cNvPr id="1028" name="Picture 4" descr="30cm Short Genuine BlackBerry Micro USB Data Sync Charger ...">
+            <a:extLst>
+              <a:ext uri="{FF2B5EF4-FFF2-40B4-BE49-F238E27FC236}">
+                <a16:creationId xmlns:a16="http://schemas.microsoft.com/office/drawing/2014/main" id="{A0983744-6A21-44D7-B470-A4852BCEB8A9}"/>
+              </a:ext>
+            </a:extLst>
+          </p:cNvPr>
+          <p:cNvPicPr>
+            <a:picLocks noChangeAspect="1" noChangeArrowheads="1"/>
+          </p:cNvPicPr>
+          <p:nvPr/>
+        </p:nvPicPr>
+        <p:blipFill>
+          <a:blip r:embed="rId4">
+            <a:extLst>
+              <a:ext uri="{28A0092B-C50C-407E-A947-70E740481C1C}">
+                <a14:useLocalDpi xmlns:a14="http://schemas.microsoft.com/office/drawing/2010/main" val="0"/>
+              </a:ext>
+            </a:extLst>
+          </a:blip>
+          <a:srcRect/>
+          <a:stretch>
+            <a:fillRect/>
+          </a:stretch>
+        </p:blipFill>
+        <p:spPr bwMode="auto">
+          <a:xfrm rot="10451204">
+            <a:off x="5051342" y="2536889"/>
+            <a:ext cx="2524837" cy="2524837"/>
+          </a:xfrm>
+          <a:prstGeom prst="rect">
+            <a:avLst/>
+          </a:prstGeom>
+          <a:noFill/>
+          <a:extLst>
+            <a:ext uri="{909E8E84-426E-40DD-AFC4-6F175D3DCCD1}">
+              <a14:hiddenFill xmlns:a14="http://schemas.microsoft.com/office/drawing/2010/main">
+                <a:solidFill>
+                  <a:srgbClr val="FFFFFF"/>
+                </a:solidFill>
+              </a14:hiddenFill>
+            </a:ext>
+          </a:extLst>
+        </p:spPr>
+      </p:pic>
+      <p:sp>
+        <p:nvSpPr>
+          <p:cNvPr id="12" name="Content Placeholder 2">
+            <a:extLst>
+              <a:ext uri="{FF2B5EF4-FFF2-40B4-BE49-F238E27FC236}">
+                <a16:creationId xmlns:a16="http://schemas.microsoft.com/office/drawing/2014/main" id="{F9601A8D-7B4D-4836-BC14-3F212B34B354}"/>
               </a:ext>
             </a:extLst>
           </p:cNvPr>
@@ -5300,19 +5642,96 @@
             <p:ph idx="1"/>
           </p:nvPr>
         </p:nvSpPr>
-        <p:spPr/>
-        <p:txBody>
-          <a:bodyPr/>
+        <p:spPr>
+          <a:xfrm>
+            <a:off x="7816646" y="4183626"/>
+            <a:ext cx="4522838" cy="2674374"/>
+          </a:xfrm>
+          <a:solidFill>
+            <a:schemeClr val="bg1">
+              <a:alpha val="83000"/>
+            </a:schemeClr>
+          </a:solidFill>
+        </p:spPr>
+        <p:txBody>
+          <a:bodyPr>
+            <a:normAutofit/>
+          </a:bodyPr>
           <a:lstStyle/>
           <a:p>
-            <a:endParaRPr lang="en-US"/>
+            <a:r>
+              <a:rPr lang="en-GB" sz="2000" b="0" i="0" dirty="0">
+                <a:solidFill>
+                  <a:srgbClr val="4F4E4E"/>
+                </a:solidFill>
+                <a:effectLst/>
+                <a:latin typeface="typoninesans regular 18"/>
+              </a:rPr>
+              <a:t>ATmega328 Microcontroller</a:t>
+            </a:r>
+          </a:p>
+          <a:p>
+            <a:r>
+              <a:rPr lang="en-GB" sz="2000" dirty="0">
+                <a:solidFill>
+                  <a:srgbClr val="4F4E4E"/>
+                </a:solidFill>
+                <a:latin typeface="typoninesans regular 18"/>
+              </a:rPr>
+              <a:t>32K Flash</a:t>
+            </a:r>
+          </a:p>
+          <a:p>
+            <a:r>
+              <a:rPr lang="en-GB" sz="2000" dirty="0">
+                <a:solidFill>
+                  <a:srgbClr val="4F4E4E"/>
+                </a:solidFill>
+                <a:latin typeface="typoninesans regular 18"/>
+              </a:rPr>
+              <a:t>2K DRAM</a:t>
+            </a:r>
+          </a:p>
+          <a:p>
+            <a:r>
+              <a:rPr lang="en-GB" sz="2000" dirty="0">
+                <a:solidFill>
+                  <a:srgbClr val="4F4E4E"/>
+                </a:solidFill>
+                <a:latin typeface="typoninesans regular 18"/>
+              </a:rPr>
+              <a:t>14 digital I/O pins</a:t>
+            </a:r>
+          </a:p>
+          <a:p>
+            <a:r>
+              <a:rPr lang="en-GB" sz="2000" dirty="0">
+                <a:solidFill>
+                  <a:srgbClr val="4F4E4E"/>
+                </a:solidFill>
+                <a:latin typeface="typoninesans regular 18"/>
+              </a:rPr>
+              <a:t>8 Analogue I/O pins</a:t>
+            </a:r>
+          </a:p>
+          <a:p>
+            <a:r>
+              <a:rPr lang="en-GB" sz="2000" dirty="0">
+                <a:solidFill>
+                  <a:srgbClr val="4F4E4E"/>
+                </a:solidFill>
+                <a:latin typeface="typoninesans regular 18"/>
+              </a:rPr>
+              <a:t>40 mA per pin</a:t>
+            </a:r>
+            <a:endParaRPr lang="en-US" sz="3200" dirty="0"/>
           </a:p>
         </p:txBody>
       </p:sp>
     </p:spTree>
     <p:extLst>
       <p:ext uri="{BB962C8B-B14F-4D97-AF65-F5344CB8AC3E}">
-        <p14:creationId xmlns:p14="http://schemas.microsoft.com/office/powerpoint/2010/main" val="2288012161"/>
+        <p14:creationId xmlns:p14="http://schemas.microsoft.com/office/powerpoint/2010/main" val="2690317456"/>
       </p:ext>
     </p:extLst>
   </p:cSld>
@@ -5339,12 +5758,42 @@
           <a:chExt cx="0" cy="0"/>
         </a:xfrm>
       </p:grpSpPr>
+      <p:pic>
+        <p:nvPicPr>
+          <p:cNvPr id="15" name="Picture 14">
+            <a:extLst>
+              <a:ext uri="{FF2B5EF4-FFF2-40B4-BE49-F238E27FC236}">
+                <a16:creationId xmlns:a16="http://schemas.microsoft.com/office/drawing/2014/main" id="{1CC3E0CE-D328-4EC1-A5B8-9584EA4B6D8B}"/>
+              </a:ext>
+            </a:extLst>
+          </p:cNvPr>
+          <p:cNvPicPr>
+            <a:picLocks noChangeAspect="1"/>
+          </p:cNvPicPr>
+          <p:nvPr/>
+        </p:nvPicPr>
+        <p:blipFill>
+          <a:blip r:embed="rId2"/>
+          <a:stretch>
+            <a:fillRect/>
+          </a:stretch>
+        </p:blipFill>
+        <p:spPr>
+          <a:xfrm>
+            <a:off x="2566219" y="985175"/>
+            <a:ext cx="7348721" cy="5828296"/>
+          </a:xfrm>
+          <a:prstGeom prst="rect">
+            <a:avLst/>
+          </a:prstGeom>
+        </p:spPr>
+      </p:pic>
       <p:sp>
         <p:nvSpPr>
           <p:cNvPr id="2" name="Title 1">
             <a:extLst>
               <a:ext uri="{FF2B5EF4-FFF2-40B4-BE49-F238E27FC236}">
-                <a16:creationId xmlns:a16="http://schemas.microsoft.com/office/drawing/2014/main" id="{A5BD21C8-7758-463C-BC15-B7103A0D1438}"/>
+                <a16:creationId xmlns:a16="http://schemas.microsoft.com/office/drawing/2014/main" id="{948833DA-25E0-42A7-8BDC-D4D59936CFBF}"/>
               </a:ext>
             </a:extLst>
           </p:cNvPr>
@@ -5362,7 +5811,7 @@
           <a:p>
             <a:r>
               <a:rPr lang="en-GB" dirty="0"/>
-              <a:t>Hardware - Reality</a:t>
+              <a:t>Hardware - Schematic</a:t>
             </a:r>
             <a:endParaRPr lang="en-US" dirty="0"/>
           </a:p>
@@ -5370,33 +5819,401 @@
       </p:sp>
       <p:sp>
         <p:nvSpPr>
-          <p:cNvPr id="3" name="Content Placeholder 2">
-            <a:extLst>
-              <a:ext uri="{FF2B5EF4-FFF2-40B4-BE49-F238E27FC236}">
-                <a16:creationId xmlns:a16="http://schemas.microsoft.com/office/drawing/2014/main" id="{8E8E11FA-7B6E-443E-BFE2-FFC039B7877C}"/>
-              </a:ext>
-            </a:extLst>
-          </p:cNvPr>
-          <p:cNvSpPr>
-            <a:spLocks noGrp="1"/>
-          </p:cNvSpPr>
-          <p:nvPr>
-            <p:ph idx="1"/>
-          </p:nvPr>
-        </p:nvSpPr>
-        <p:spPr/>
-        <p:txBody>
-          <a:bodyPr/>
+          <p:cNvPr id="8" name="TextBox 7">
+            <a:extLst>
+              <a:ext uri="{FF2B5EF4-FFF2-40B4-BE49-F238E27FC236}">
+                <a16:creationId xmlns:a16="http://schemas.microsoft.com/office/drawing/2014/main" id="{2AF5F55F-3A35-4863-A097-9901D73DB583}"/>
+              </a:ext>
+            </a:extLst>
+          </p:cNvPr>
+          <p:cNvSpPr txBox="1"/>
+          <p:nvPr/>
+        </p:nvSpPr>
+        <p:spPr>
+          <a:xfrm>
+            <a:off x="2222307" y="2934464"/>
+            <a:ext cx="883575" cy="307777"/>
+          </a:xfrm>
+          <a:prstGeom prst="rect">
+            <a:avLst/>
+          </a:prstGeom>
+          <a:noFill/>
+        </p:spPr>
+        <p:txBody>
+          <a:bodyPr wrap="none" rtlCol="0">
+            <a:spAutoFit/>
+          </a:bodyPr>
           <a:lstStyle/>
           <a:p>
-            <a:endParaRPr lang="en-US"/>
+            <a:r>
+              <a:rPr lang="en-GB" sz="1400" dirty="0">
+                <a:solidFill>
+                  <a:srgbClr val="03849A"/>
+                </a:solidFill>
+                <a:latin typeface="Verdana Pro" panose="020B0604020202020204" pitchFamily="34" charset="0"/>
+                <a:cs typeface="Courier New" panose="02070309020205020404" pitchFamily="49" charset="0"/>
+              </a:rPr>
+              <a:t>Arduino</a:t>
+            </a:r>
+          </a:p>
+        </p:txBody>
+      </p:sp>
+      <p:sp>
+        <p:nvSpPr>
+          <p:cNvPr id="9" name="TextBox 8">
+            <a:extLst>
+              <a:ext uri="{FF2B5EF4-FFF2-40B4-BE49-F238E27FC236}">
+                <a16:creationId xmlns:a16="http://schemas.microsoft.com/office/drawing/2014/main" id="{A753DF37-8646-4E89-8F7A-0379CF9ECC41}"/>
+              </a:ext>
+            </a:extLst>
+          </p:cNvPr>
+          <p:cNvSpPr txBox="1"/>
+          <p:nvPr/>
+        </p:nvSpPr>
+        <p:spPr>
+          <a:xfrm>
+            <a:off x="9979296" y="4872493"/>
+            <a:ext cx="1710812" cy="738664"/>
+          </a:xfrm>
+          <a:prstGeom prst="rect">
+            <a:avLst/>
+          </a:prstGeom>
+          <a:noFill/>
+        </p:spPr>
+        <p:txBody>
+          <a:bodyPr wrap="square" rtlCol="0">
+            <a:spAutoFit/>
+          </a:bodyPr>
+          <a:lstStyle/>
+          <a:p>
+            <a:r>
+              <a:rPr lang="en-GB" sz="1400" dirty="0">
+                <a:solidFill>
+                  <a:srgbClr val="03849A"/>
+                </a:solidFill>
+                <a:latin typeface="Verdana Pro" panose="020B0604020202020204" pitchFamily="34" charset="0"/>
+                <a:cs typeface="Courier New" panose="02070309020205020404" pitchFamily="49" charset="0"/>
+              </a:rPr>
+              <a:t>R1, R2, R3 - Pulldown resistors</a:t>
+            </a:r>
+          </a:p>
+        </p:txBody>
+      </p:sp>
+      <p:sp>
+        <p:nvSpPr>
+          <p:cNvPr id="10" name="TextBox 9">
+            <a:extLst>
+              <a:ext uri="{FF2B5EF4-FFF2-40B4-BE49-F238E27FC236}">
+                <a16:creationId xmlns:a16="http://schemas.microsoft.com/office/drawing/2014/main" id="{6308D80E-0504-4536-A48C-88F16D1BE45E}"/>
+              </a:ext>
+            </a:extLst>
+          </p:cNvPr>
+          <p:cNvSpPr txBox="1"/>
+          <p:nvPr/>
+        </p:nvSpPr>
+        <p:spPr>
+          <a:xfrm>
+            <a:off x="2428106" y="1329470"/>
+            <a:ext cx="1031088" cy="523220"/>
+          </a:xfrm>
+          <a:prstGeom prst="rect">
+            <a:avLst/>
+          </a:prstGeom>
+          <a:noFill/>
+        </p:spPr>
+        <p:txBody>
+          <a:bodyPr wrap="square" rtlCol="0">
+            <a:spAutoFit/>
+          </a:bodyPr>
+          <a:lstStyle/>
+          <a:p>
+            <a:r>
+              <a:rPr lang="en-GB" sz="1400" dirty="0">
+                <a:solidFill>
+                  <a:srgbClr val="03849A"/>
+                </a:solidFill>
+                <a:latin typeface="Verdana Pro" panose="020B0604020202020204" pitchFamily="34" charset="0"/>
+                <a:cs typeface="Courier New" panose="02070309020205020404" pitchFamily="49" charset="0"/>
+              </a:rPr>
+              <a:t>P1 – LCD contrast</a:t>
+            </a:r>
+          </a:p>
+        </p:txBody>
+      </p:sp>
+      <p:sp>
+        <p:nvSpPr>
+          <p:cNvPr id="11" name="TextBox 10">
+            <a:extLst>
+              <a:ext uri="{FF2B5EF4-FFF2-40B4-BE49-F238E27FC236}">
+                <a16:creationId xmlns:a16="http://schemas.microsoft.com/office/drawing/2014/main" id="{8CE6E4C0-35EB-4D27-9D80-08FC16AC574C}"/>
+              </a:ext>
+            </a:extLst>
+          </p:cNvPr>
+          <p:cNvSpPr txBox="1"/>
+          <p:nvPr/>
+        </p:nvSpPr>
+        <p:spPr>
+          <a:xfrm>
+            <a:off x="2428106" y="5784335"/>
+            <a:ext cx="1129411" cy="738664"/>
+          </a:xfrm>
+          <a:prstGeom prst="rect">
+            <a:avLst/>
+          </a:prstGeom>
+          <a:noFill/>
+        </p:spPr>
+        <p:txBody>
+          <a:bodyPr wrap="square" rtlCol="0">
+            <a:spAutoFit/>
+          </a:bodyPr>
+          <a:lstStyle/>
+          <a:p>
+            <a:r>
+              <a:rPr lang="en-GB" sz="1400" dirty="0">
+                <a:solidFill>
+                  <a:srgbClr val="03849A"/>
+                </a:solidFill>
+                <a:latin typeface="Verdana Pro" panose="020B0604020202020204" pitchFamily="34" charset="0"/>
+                <a:cs typeface="Courier New" panose="02070309020205020404" pitchFamily="49" charset="0"/>
+              </a:rPr>
+              <a:t>R4, R5 - Voltage divider</a:t>
+            </a:r>
+          </a:p>
+        </p:txBody>
+      </p:sp>
+      <p:sp>
+        <p:nvSpPr>
+          <p:cNvPr id="12" name="TextBox 11">
+            <a:extLst>
+              <a:ext uri="{FF2B5EF4-FFF2-40B4-BE49-F238E27FC236}">
+                <a16:creationId xmlns:a16="http://schemas.microsoft.com/office/drawing/2014/main" id="{C8CA6AF7-9C70-48DD-8047-68880473B498}"/>
+              </a:ext>
+            </a:extLst>
+          </p:cNvPr>
+          <p:cNvSpPr txBox="1"/>
+          <p:nvPr/>
+        </p:nvSpPr>
+        <p:spPr>
+          <a:xfrm>
+            <a:off x="9914940" y="2719021"/>
+            <a:ext cx="1710812" cy="523220"/>
+          </a:xfrm>
+          <a:prstGeom prst="rect">
+            <a:avLst/>
+          </a:prstGeom>
+          <a:noFill/>
+        </p:spPr>
+        <p:txBody>
+          <a:bodyPr wrap="square" rtlCol="0">
+            <a:spAutoFit/>
+          </a:bodyPr>
+          <a:lstStyle/>
+          <a:p>
+            <a:r>
+              <a:rPr lang="en-GB" sz="1400" dirty="0">
+                <a:solidFill>
+                  <a:srgbClr val="03849A"/>
+                </a:solidFill>
+                <a:latin typeface="Verdana Pro" panose="020B0604020202020204" pitchFamily="34" charset="0"/>
+                <a:cs typeface="Courier New" panose="02070309020205020404" pitchFamily="49" charset="0"/>
+              </a:rPr>
+              <a:t>R6 Current limiting resistor</a:t>
+            </a:r>
+          </a:p>
+        </p:txBody>
+      </p:sp>
+      <p:sp>
+        <p:nvSpPr>
+          <p:cNvPr id="13" name="TextBox 12">
+            <a:extLst>
+              <a:ext uri="{FF2B5EF4-FFF2-40B4-BE49-F238E27FC236}">
+                <a16:creationId xmlns:a16="http://schemas.microsoft.com/office/drawing/2014/main" id="{3DCD7F3D-6944-4EC8-9AA9-72F068E810E9}"/>
+              </a:ext>
+            </a:extLst>
+          </p:cNvPr>
+          <p:cNvSpPr txBox="1"/>
+          <p:nvPr/>
+        </p:nvSpPr>
+        <p:spPr>
+          <a:xfrm>
+            <a:off x="9914940" y="1591080"/>
+            <a:ext cx="1710812" cy="738664"/>
+          </a:xfrm>
+          <a:prstGeom prst="rect">
+            <a:avLst/>
+          </a:prstGeom>
+          <a:noFill/>
+        </p:spPr>
+        <p:txBody>
+          <a:bodyPr wrap="square" rtlCol="0">
+            <a:spAutoFit/>
+          </a:bodyPr>
+          <a:lstStyle/>
+          <a:p>
+            <a:r>
+              <a:rPr lang="en-GB" sz="1400" dirty="0">
+                <a:solidFill>
+                  <a:srgbClr val="03849A"/>
+                </a:solidFill>
+                <a:latin typeface="Verdana Pro" panose="020B0604020202020204" pitchFamily="34" charset="0"/>
+                <a:cs typeface="Courier New" panose="02070309020205020404" pitchFamily="49" charset="0"/>
+              </a:rPr>
+              <a:t>S1 – Cycle</a:t>
+            </a:r>
+          </a:p>
+          <a:p>
+            <a:r>
+              <a:rPr lang="en-GB" sz="1400" dirty="0">
+                <a:solidFill>
+                  <a:srgbClr val="03849A"/>
+                </a:solidFill>
+                <a:latin typeface="Verdana Pro" panose="020B0604020202020204" pitchFamily="34" charset="0"/>
+                <a:cs typeface="Courier New" panose="02070309020205020404" pitchFamily="49" charset="0"/>
+              </a:rPr>
+              <a:t>S2 – Mute</a:t>
+            </a:r>
+          </a:p>
+          <a:p>
+            <a:r>
+              <a:rPr lang="en-GB" sz="1400" dirty="0">
+                <a:solidFill>
+                  <a:srgbClr val="03849A"/>
+                </a:solidFill>
+                <a:latin typeface="Verdana Pro" panose="020B0604020202020204" pitchFamily="34" charset="0"/>
+                <a:cs typeface="Courier New" panose="02070309020205020404" pitchFamily="49" charset="0"/>
+              </a:rPr>
+              <a:t>S3 - Camera</a:t>
+            </a:r>
+          </a:p>
+        </p:txBody>
+      </p:sp>
+      <p:sp>
+        <p:nvSpPr>
+          <p:cNvPr id="16" name="TextBox 15">
+            <a:extLst>
+              <a:ext uri="{FF2B5EF4-FFF2-40B4-BE49-F238E27FC236}">
+                <a16:creationId xmlns:a16="http://schemas.microsoft.com/office/drawing/2014/main" id="{472A8337-1EBE-4027-9580-D63F090056D6}"/>
+              </a:ext>
+            </a:extLst>
+          </p:cNvPr>
+          <p:cNvSpPr txBox="1"/>
+          <p:nvPr/>
+        </p:nvSpPr>
+        <p:spPr>
+          <a:xfrm>
+            <a:off x="9979296" y="5999779"/>
+            <a:ext cx="1710812" cy="523220"/>
+          </a:xfrm>
+          <a:prstGeom prst="rect">
+            <a:avLst/>
+          </a:prstGeom>
+          <a:noFill/>
+        </p:spPr>
+        <p:txBody>
+          <a:bodyPr wrap="square" rtlCol="0">
+            <a:spAutoFit/>
+          </a:bodyPr>
+          <a:lstStyle/>
+          <a:p>
+            <a:r>
+              <a:rPr lang="en-GB" sz="1400" dirty="0">
+                <a:solidFill>
+                  <a:srgbClr val="03849A"/>
+                </a:solidFill>
+                <a:latin typeface="Verdana Pro" panose="020B0604020202020204" pitchFamily="34" charset="0"/>
+                <a:cs typeface="Courier New" panose="02070309020205020404" pitchFamily="49" charset="0"/>
+              </a:rPr>
+              <a:t>J1 – Piezo buzzer</a:t>
+            </a:r>
+          </a:p>
+        </p:txBody>
+      </p:sp>
+      <p:sp>
+        <p:nvSpPr>
+          <p:cNvPr id="17" name="TextBox 16">
+            <a:extLst>
+              <a:ext uri="{FF2B5EF4-FFF2-40B4-BE49-F238E27FC236}">
+                <a16:creationId xmlns:a16="http://schemas.microsoft.com/office/drawing/2014/main" id="{DAAF099C-8637-4DEB-A952-DA3D673B8A24}"/>
+              </a:ext>
+            </a:extLst>
+          </p:cNvPr>
+          <p:cNvSpPr txBox="1"/>
+          <p:nvPr/>
+        </p:nvSpPr>
+        <p:spPr>
+          <a:xfrm>
+            <a:off x="5783993" y="1283303"/>
+            <a:ext cx="546945" cy="307777"/>
+          </a:xfrm>
+          <a:prstGeom prst="rect">
+            <a:avLst/>
+          </a:prstGeom>
+          <a:noFill/>
+        </p:spPr>
+        <p:txBody>
+          <a:bodyPr wrap="none" rtlCol="0">
+            <a:spAutoFit/>
+          </a:bodyPr>
+          <a:lstStyle/>
+          <a:p>
+            <a:r>
+              <a:rPr lang="en-GB" sz="1400" dirty="0">
+                <a:solidFill>
+                  <a:srgbClr val="03849A"/>
+                </a:solidFill>
+                <a:latin typeface="Verdana Pro" panose="020B0604020202020204" pitchFamily="34" charset="0"/>
+                <a:cs typeface="Courier New" panose="02070309020205020404" pitchFamily="49" charset="0"/>
+              </a:rPr>
+              <a:t>LCD</a:t>
+            </a:r>
+          </a:p>
+        </p:txBody>
+      </p:sp>
+      <p:sp>
+        <p:nvSpPr>
+          <p:cNvPr id="18" name="TextBox 17">
+            <a:extLst>
+              <a:ext uri="{FF2B5EF4-FFF2-40B4-BE49-F238E27FC236}">
+                <a16:creationId xmlns:a16="http://schemas.microsoft.com/office/drawing/2014/main" id="{D3233DA6-4813-423D-94D4-45DD9B1A6570}"/>
+              </a:ext>
+            </a:extLst>
+          </p:cNvPr>
+          <p:cNvSpPr txBox="1"/>
+          <p:nvPr/>
+        </p:nvSpPr>
+        <p:spPr>
+          <a:xfrm>
+            <a:off x="5531519" y="5185638"/>
+            <a:ext cx="1051891" cy="307777"/>
+          </a:xfrm>
+          <a:prstGeom prst="rect">
+            <a:avLst/>
+          </a:prstGeom>
+          <a:noFill/>
+        </p:spPr>
+        <p:txBody>
+          <a:bodyPr wrap="none" rtlCol="0">
+            <a:spAutoFit/>
+          </a:bodyPr>
+          <a:lstStyle/>
+          <a:p>
+            <a:r>
+              <a:rPr lang="en-GB" sz="1400" dirty="0">
+                <a:solidFill>
+                  <a:srgbClr val="03849A"/>
+                </a:solidFill>
+                <a:latin typeface="Verdana Pro" panose="020B0604020202020204" pitchFamily="34" charset="0"/>
+                <a:cs typeface="Courier New" panose="02070309020205020404" pitchFamily="49" charset="0"/>
+              </a:rPr>
+              <a:t>Bluetooth</a:t>
+            </a:r>
           </a:p>
         </p:txBody>
       </p:sp>
     </p:spTree>
     <p:extLst>
       <p:ext uri="{BB962C8B-B14F-4D97-AF65-F5344CB8AC3E}">
-        <p14:creationId xmlns:p14="http://schemas.microsoft.com/office/powerpoint/2010/main" val="3127256210"/>
+        <p14:creationId xmlns:p14="http://schemas.microsoft.com/office/powerpoint/2010/main" val="2288012161"/>
       </p:ext>
     </p:extLst>
   </p:cSld>
@@ -5428,7 +6245,7 @@
           <p:cNvPr id="2" name="Title 1">
             <a:extLst>
               <a:ext uri="{FF2B5EF4-FFF2-40B4-BE49-F238E27FC236}">
-                <a16:creationId xmlns:a16="http://schemas.microsoft.com/office/drawing/2014/main" id="{A2A60658-2956-42D6-87F0-3C696CFA5A8F}"/>
+                <a16:creationId xmlns:a16="http://schemas.microsoft.com/office/drawing/2014/main" id="{A5BD21C8-7758-463C-BC15-B7103A0D1438}"/>
               </a:ext>
             </a:extLst>
           </p:cNvPr>
@@ -5446,41 +6263,16 @@
           <a:p>
             <a:r>
               <a:rPr lang="en-GB" dirty="0"/>
-              <a:t>Explanation of circuit?  Explanation of software compilation and upload?</a:t>
+              <a:t>Hardware - Reality</a:t>
             </a:r>
             <a:endParaRPr lang="en-US" dirty="0"/>
-          </a:p>
-        </p:txBody>
-      </p:sp>
-      <p:sp>
-        <p:nvSpPr>
-          <p:cNvPr id="3" name="Content Placeholder 2">
-            <a:extLst>
-              <a:ext uri="{FF2B5EF4-FFF2-40B4-BE49-F238E27FC236}">
-                <a16:creationId xmlns:a16="http://schemas.microsoft.com/office/drawing/2014/main" id="{D184048A-161A-4DE5-850C-72AFCED92C5E}"/>
-              </a:ext>
-            </a:extLst>
-          </p:cNvPr>
-          <p:cNvSpPr>
-            <a:spLocks noGrp="1"/>
-          </p:cNvSpPr>
-          <p:nvPr>
-            <p:ph idx="1"/>
-          </p:nvPr>
-        </p:nvSpPr>
-        <p:spPr/>
-        <p:txBody>
-          <a:bodyPr/>
-          <a:lstStyle/>
-          <a:p>
-            <a:endParaRPr lang="en-US"/>
           </a:p>
         </p:txBody>
       </p:sp>
     </p:spTree>
     <p:extLst>
       <p:ext uri="{BB962C8B-B14F-4D97-AF65-F5344CB8AC3E}">
-        <p14:creationId xmlns:p14="http://schemas.microsoft.com/office/powerpoint/2010/main" val="2172502747"/>
+        <p14:creationId xmlns:p14="http://schemas.microsoft.com/office/powerpoint/2010/main" val="3127256210"/>
       </p:ext>
     </p:extLst>
   </p:cSld>
@@ -5533,31 +6325,6 @@
               <a:t>Protocol</a:t>
             </a:r>
             <a:endParaRPr lang="en-US" dirty="0"/>
-          </a:p>
-        </p:txBody>
-      </p:sp>
-      <p:sp>
-        <p:nvSpPr>
-          <p:cNvPr id="3" name="Content Placeholder 2">
-            <a:extLst>
-              <a:ext uri="{FF2B5EF4-FFF2-40B4-BE49-F238E27FC236}">
-                <a16:creationId xmlns:a16="http://schemas.microsoft.com/office/drawing/2014/main" id="{CB5EF94B-256D-46F8-8093-23AB37550155}"/>
-              </a:ext>
-            </a:extLst>
-          </p:cNvPr>
-          <p:cNvSpPr>
-            <a:spLocks noGrp="1"/>
-          </p:cNvSpPr>
-          <p:nvPr>
-            <p:ph idx="1"/>
-          </p:nvPr>
-        </p:nvSpPr>
-        <p:spPr/>
-        <p:txBody>
-          <a:bodyPr/>
-          <a:lstStyle/>
-          <a:p>
-            <a:endParaRPr lang="en-US"/>
           </a:p>
         </p:txBody>
       </p:sp>
@@ -5804,14 +6571,14 @@
             <p:ph idx="1"/>
             <p:extLst>
               <p:ext uri="{D42A27DB-BD31-4B8C-83A1-F6EECF244321}">
-                <p14:modId xmlns:p14="http://schemas.microsoft.com/office/powerpoint/2010/main" val="924045016"/>
+                <p14:modId xmlns:p14="http://schemas.microsoft.com/office/powerpoint/2010/main" val="4154645259"/>
               </p:ext>
             </p:extLst>
           </p:nvPr>
         </p:nvGraphicFramePr>
         <p:xfrm>
-          <a:off x="2175643" y="2158399"/>
-          <a:ext cx="3862550" cy="1786536"/>
+          <a:off x="1833828" y="2574966"/>
+          <a:ext cx="4335914" cy="3110781"/>
         </p:xfrm>
         <a:graphic>
           <a:graphicData uri="http://schemas.openxmlformats.org/drawingml/2006/table">
@@ -5820,21 +6587,21 @@
                 <a:tableStyleId>{5C22544A-7EE6-4342-B048-85BDC9FD1C3A}</a:tableStyleId>
               </a:tblPr>
               <a:tblGrid>
-                <a:gridCol w="1229709">
+                <a:gridCol w="1972574">
                   <a:extLst>
                     <a:ext uri="{9D8B030D-6E8A-4147-A177-3AD203B41FA5}">
                       <a16:colId xmlns:a16="http://schemas.microsoft.com/office/drawing/2014/main" val="4008364951"/>
                     </a:ext>
                   </a:extLst>
                 </a:gridCol>
-                <a:gridCol w="1270857">
+                <a:gridCol w="549288">
                   <a:extLst>
                     <a:ext uri="{9D8B030D-6E8A-4147-A177-3AD203B41FA5}">
                       <a16:colId xmlns:a16="http://schemas.microsoft.com/office/drawing/2014/main" val="3554440371"/>
                     </a:ext>
                   </a:extLst>
                 </a:gridCol>
-                <a:gridCol w="1361984">
+                <a:gridCol w="1814052">
                   <a:extLst>
                     <a:ext uri="{9D8B030D-6E8A-4147-A177-3AD203B41FA5}">
                       <a16:colId xmlns:a16="http://schemas.microsoft.com/office/drawing/2014/main" val="3385093010"/>
@@ -5885,7 +6652,590 @@
                           </a:solidFill>
                           <a:latin typeface="Verdana Pro Cond SemiBold" panose="020B0706030504040204" pitchFamily="34" charset="0"/>
                         </a:rPr>
-                        <a:t>Quantity</a:t>
+                        <a:t>#</a:t>
+                      </a:r>
+                      <a:endParaRPr lang="en-US" sz="1600" dirty="0">
+                        <a:solidFill>
+                          <a:srgbClr val="FACF31"/>
+                        </a:solidFill>
+                        <a:latin typeface="Verdana Pro Cond SemiBold" panose="020B0706030504040204" pitchFamily="34" charset="0"/>
+                      </a:endParaRPr>
+                    </a:p>
+                  </a:txBody>
+                  <a:tcPr>
+                    <a:solidFill>
+                      <a:srgbClr val="03849A"/>
+                    </a:solidFill>
+                  </a:tcPr>
+                </a:tc>
+                <a:tc>
+                  <a:txBody>
+                    <a:bodyPr/>
+                    <a:lstStyle/>
+                    <a:p>
+                      <a:pPr algn="ctr"/>
+                      <a:r>
+                        <a:rPr lang="en-GB" sz="1600" dirty="0">
+                          <a:solidFill>
+                            <a:srgbClr val="FACF31"/>
+                          </a:solidFill>
+                          <a:latin typeface="Verdana Pro Cond SemiBold" panose="020B0706030504040204" pitchFamily="34" charset="0"/>
+                        </a:rPr>
+                        <a:t>Total Cost</a:t>
+                      </a:r>
+                      <a:endParaRPr lang="en-US" sz="1600" dirty="0">
+                        <a:solidFill>
+                          <a:srgbClr val="FACF31"/>
+                        </a:solidFill>
+                        <a:latin typeface="Verdana Pro Cond SemiBold" panose="020B0706030504040204" pitchFamily="34" charset="0"/>
+                      </a:endParaRPr>
+                    </a:p>
+                  </a:txBody>
+                  <a:tcPr>
+                    <a:solidFill>
+                      <a:srgbClr val="03849A"/>
+                    </a:solidFill>
+                  </a:tcPr>
+                </a:tc>
+                <a:extLst>
+                  <a:ext uri="{0D108BD9-81ED-4DB2-BD59-A6C34878D82A}">
+                    <a16:rowId xmlns:a16="http://schemas.microsoft.com/office/drawing/2014/main" val="2809392100"/>
+                  </a:ext>
+                </a:extLst>
+              </a:tr>
+              <a:tr h="441415">
+                <a:tc>
+                  <a:txBody>
+                    <a:bodyPr/>
+                    <a:lstStyle/>
+                    <a:p>
+                      <a:r>
+                        <a:rPr lang="en-US" b="0" dirty="0">
+                          <a:latin typeface="Verdana Pro Cond SemiBold" panose="020B0706030504040204" pitchFamily="34" charset="0"/>
+                        </a:rPr>
+                        <a:t>Arduino Nano</a:t>
+                      </a:r>
+                    </a:p>
+                  </a:txBody>
+                  <a:tcPr/>
+                </a:tc>
+                <a:tc>
+                  <a:txBody>
+                    <a:bodyPr/>
+                    <a:lstStyle/>
+                    <a:p>
+                      <a:r>
+                        <a:rPr lang="en-US" b="0" dirty="0">
+                          <a:latin typeface="Verdana Pro Cond SemiBold" panose="020B0706030504040204" pitchFamily="34" charset="0"/>
+                        </a:rPr>
+                        <a:t>1</a:t>
+                      </a:r>
+                    </a:p>
+                  </a:txBody>
+                  <a:tcPr/>
+                </a:tc>
+                <a:tc>
+                  <a:txBody>
+                    <a:bodyPr/>
+                    <a:lstStyle/>
+                    <a:p>
+                      <a:endParaRPr lang="en-US" b="0" dirty="0">
+                        <a:latin typeface="Verdana Pro Cond SemiBold" panose="020B0706030504040204" pitchFamily="34" charset="0"/>
+                      </a:endParaRPr>
+                    </a:p>
+                  </a:txBody>
+                  <a:tcPr/>
+                </a:tc>
+                <a:extLst>
+                  <a:ext uri="{0D108BD9-81ED-4DB2-BD59-A6C34878D82A}">
+                    <a16:rowId xmlns:a16="http://schemas.microsoft.com/office/drawing/2014/main" val="250704751"/>
+                  </a:ext>
+                </a:extLst>
+              </a:tr>
+              <a:tr h="441415">
+                <a:tc>
+                  <a:txBody>
+                    <a:bodyPr/>
+                    <a:lstStyle/>
+                    <a:p>
+                      <a:r>
+                        <a:rPr lang="en-US" b="0" dirty="0">
+                          <a:latin typeface="Verdana Pro Cond SemiBold" panose="020B0706030504040204" pitchFamily="34" charset="0"/>
+                        </a:rPr>
+                        <a:t>LCD Display</a:t>
+                      </a:r>
+                    </a:p>
+                  </a:txBody>
+                  <a:tcPr/>
+                </a:tc>
+                <a:tc>
+                  <a:txBody>
+                    <a:bodyPr/>
+                    <a:lstStyle/>
+                    <a:p>
+                      <a:r>
+                        <a:rPr lang="en-US" b="0" dirty="0">
+                          <a:latin typeface="Verdana Pro Cond SemiBold" panose="020B0706030504040204" pitchFamily="34" charset="0"/>
+                        </a:rPr>
+                        <a:t>1</a:t>
+                      </a:r>
+                    </a:p>
+                  </a:txBody>
+                  <a:tcPr/>
+                </a:tc>
+                <a:tc>
+                  <a:txBody>
+                    <a:bodyPr/>
+                    <a:lstStyle/>
+                    <a:p>
+                      <a:endParaRPr lang="en-US" b="0" dirty="0">
+                        <a:latin typeface="Verdana Pro Cond SemiBold" panose="020B0706030504040204" pitchFamily="34" charset="0"/>
+                      </a:endParaRPr>
+                    </a:p>
+                  </a:txBody>
+                  <a:tcPr/>
+                </a:tc>
+                <a:extLst>
+                  <a:ext uri="{0D108BD9-81ED-4DB2-BD59-A6C34878D82A}">
+                    <a16:rowId xmlns:a16="http://schemas.microsoft.com/office/drawing/2014/main" val="2738096251"/>
+                  </a:ext>
+                </a:extLst>
+              </a:tr>
+              <a:tr h="441415">
+                <a:tc>
+                  <a:txBody>
+                    <a:bodyPr/>
+                    <a:lstStyle/>
+                    <a:p>
+                      <a:r>
+                        <a:rPr lang="en-US" b="0" dirty="0">
+                          <a:latin typeface="Verdana Pro Cond SemiBold" panose="020B0706030504040204" pitchFamily="34" charset="0"/>
+                        </a:rPr>
+                        <a:t>Resistors</a:t>
+                      </a:r>
+                    </a:p>
+                  </a:txBody>
+                  <a:tcPr/>
+                </a:tc>
+                <a:tc>
+                  <a:txBody>
+                    <a:bodyPr/>
+                    <a:lstStyle/>
+                    <a:p>
+                      <a:r>
+                        <a:rPr lang="en-US" b="0" dirty="0">
+                          <a:latin typeface="Verdana Pro Cond SemiBold" panose="020B0706030504040204" pitchFamily="34" charset="0"/>
+                        </a:rPr>
+                        <a:t>6</a:t>
+                      </a:r>
+                    </a:p>
+                  </a:txBody>
+                  <a:tcPr/>
+                </a:tc>
+                <a:tc>
+                  <a:txBody>
+                    <a:bodyPr/>
+                    <a:lstStyle/>
+                    <a:p>
+                      <a:endParaRPr lang="en-US" b="0" dirty="0">
+                        <a:latin typeface="Verdana Pro Cond SemiBold" panose="020B0706030504040204" pitchFamily="34" charset="0"/>
+                      </a:endParaRPr>
+                    </a:p>
+                  </a:txBody>
+                  <a:tcPr/>
+                </a:tc>
+                <a:extLst>
+                  <a:ext uri="{0D108BD9-81ED-4DB2-BD59-A6C34878D82A}">
+                    <a16:rowId xmlns:a16="http://schemas.microsoft.com/office/drawing/2014/main" val="2961306089"/>
+                  </a:ext>
+                </a:extLst>
+              </a:tr>
+              <a:tr h="441415">
+                <a:tc>
+                  <a:txBody>
+                    <a:bodyPr/>
+                    <a:lstStyle/>
+                    <a:p>
+                      <a:r>
+                        <a:rPr lang="en-US" b="0" dirty="0">
+                          <a:latin typeface="Verdana Pro Cond SemiBold" panose="020B0706030504040204" pitchFamily="34" charset="0"/>
+                        </a:rPr>
+                        <a:t>Potentiometer</a:t>
+                      </a:r>
+                    </a:p>
+                  </a:txBody>
+                  <a:tcPr/>
+                </a:tc>
+                <a:tc>
+                  <a:txBody>
+                    <a:bodyPr/>
+                    <a:lstStyle/>
+                    <a:p>
+                      <a:r>
+                        <a:rPr lang="en-US" b="0" dirty="0">
+                          <a:latin typeface="Verdana Pro Cond SemiBold" panose="020B0706030504040204" pitchFamily="34" charset="0"/>
+                        </a:rPr>
+                        <a:t>1</a:t>
+                      </a:r>
+                    </a:p>
+                  </a:txBody>
+                  <a:tcPr/>
+                </a:tc>
+                <a:tc>
+                  <a:txBody>
+                    <a:bodyPr/>
+                    <a:lstStyle/>
+                    <a:p>
+                      <a:endParaRPr lang="en-US" b="0" dirty="0">
+                        <a:latin typeface="Verdana Pro Cond SemiBold" panose="020B0706030504040204" pitchFamily="34" charset="0"/>
+                      </a:endParaRPr>
+                    </a:p>
+                  </a:txBody>
+                  <a:tcPr/>
+                </a:tc>
+                <a:extLst>
+                  <a:ext uri="{0D108BD9-81ED-4DB2-BD59-A6C34878D82A}">
+                    <a16:rowId xmlns:a16="http://schemas.microsoft.com/office/drawing/2014/main" val="3841298703"/>
+                  </a:ext>
+                </a:extLst>
+              </a:tr>
+              <a:tr h="441415">
+                <a:tc>
+                  <a:txBody>
+                    <a:bodyPr/>
+                    <a:lstStyle/>
+                    <a:p>
+                      <a:r>
+                        <a:rPr lang="en-US" b="0" dirty="0">
+                          <a:latin typeface="Verdana Pro Cond SemiBold" panose="020B0706030504040204" pitchFamily="34" charset="0"/>
+                        </a:rPr>
+                        <a:t>Switch</a:t>
+                      </a:r>
+                    </a:p>
+                  </a:txBody>
+                  <a:tcPr/>
+                </a:tc>
+                <a:tc>
+                  <a:txBody>
+                    <a:bodyPr/>
+                    <a:lstStyle/>
+                    <a:p>
+                      <a:r>
+                        <a:rPr lang="en-US" b="0" dirty="0">
+                          <a:latin typeface="Verdana Pro Cond SemiBold" panose="020B0706030504040204" pitchFamily="34" charset="0"/>
+                        </a:rPr>
+                        <a:t>3</a:t>
+                      </a:r>
+                    </a:p>
+                  </a:txBody>
+                  <a:tcPr/>
+                </a:tc>
+                <a:tc>
+                  <a:txBody>
+                    <a:bodyPr/>
+                    <a:lstStyle/>
+                    <a:p>
+                      <a:endParaRPr lang="en-US" b="0" dirty="0">
+                        <a:latin typeface="Verdana Pro Cond SemiBold" panose="020B0706030504040204" pitchFamily="34" charset="0"/>
+                      </a:endParaRPr>
+                    </a:p>
+                  </a:txBody>
+                  <a:tcPr/>
+                </a:tc>
+                <a:extLst>
+                  <a:ext uri="{0D108BD9-81ED-4DB2-BD59-A6C34878D82A}">
+                    <a16:rowId xmlns:a16="http://schemas.microsoft.com/office/drawing/2014/main" val="791020541"/>
+                  </a:ext>
+                </a:extLst>
+              </a:tr>
+              <a:tr h="441415">
+                <a:tc>
+                  <a:txBody>
+                    <a:bodyPr/>
+                    <a:lstStyle/>
+                    <a:p>
+                      <a:r>
+                        <a:rPr lang="en-US" b="0" dirty="0">
+                          <a:latin typeface="Verdana Pro Cond SemiBold" panose="020B0706030504040204" pitchFamily="34" charset="0"/>
+                        </a:rPr>
+                        <a:t>Piezo Buzzer</a:t>
+                      </a:r>
+                    </a:p>
+                  </a:txBody>
+                  <a:tcPr/>
+                </a:tc>
+                <a:tc>
+                  <a:txBody>
+                    <a:bodyPr/>
+                    <a:lstStyle/>
+                    <a:p>
+                      <a:r>
+                        <a:rPr lang="en-US" b="0" dirty="0">
+                          <a:latin typeface="Verdana Pro Cond SemiBold" panose="020B0706030504040204" pitchFamily="34" charset="0"/>
+                        </a:rPr>
+                        <a:t>1</a:t>
+                      </a:r>
+                    </a:p>
+                  </a:txBody>
+                  <a:tcPr/>
+                </a:tc>
+                <a:tc>
+                  <a:txBody>
+                    <a:bodyPr/>
+                    <a:lstStyle/>
+                    <a:p>
+                      <a:endParaRPr lang="en-US" b="0" dirty="0">
+                        <a:latin typeface="Verdana Pro Cond SemiBold" panose="020B0706030504040204" pitchFamily="34" charset="0"/>
+                      </a:endParaRPr>
+                    </a:p>
+                  </a:txBody>
+                  <a:tcPr/>
+                </a:tc>
+                <a:extLst>
+                  <a:ext uri="{0D108BD9-81ED-4DB2-BD59-A6C34878D82A}">
+                    <a16:rowId xmlns:a16="http://schemas.microsoft.com/office/drawing/2014/main" val="1685005352"/>
+                  </a:ext>
+                </a:extLst>
+              </a:tr>
+            </a:tbl>
+          </a:graphicData>
+        </a:graphic>
+      </p:graphicFrame>
+      <p:sp>
+        <p:nvSpPr>
+          <p:cNvPr id="4" name="Title 1">
+            <a:extLst>
+              <a:ext uri="{FF2B5EF4-FFF2-40B4-BE49-F238E27FC236}">
+                <a16:creationId xmlns:a16="http://schemas.microsoft.com/office/drawing/2014/main" id="{6B8645AE-7722-4D5E-A028-00E8CEF7CBF6}"/>
+              </a:ext>
+            </a:extLst>
+          </p:cNvPr>
+          <p:cNvSpPr txBox="1">
+            <a:spLocks/>
+          </p:cNvSpPr>
+          <p:nvPr/>
+        </p:nvSpPr>
+        <p:spPr>
+          <a:xfrm>
+            <a:off x="1833828" y="1867065"/>
+            <a:ext cx="1961424" cy="480131"/>
+          </a:xfrm>
+          <a:prstGeom prst="rect">
+            <a:avLst/>
+          </a:prstGeom>
+          <a:solidFill>
+            <a:srgbClr val="03849A"/>
+          </a:solidFill>
+        </p:spPr>
+        <p:txBody>
+          <a:bodyPr vert="horz" wrap="square" lIns="91440" tIns="45720" rIns="91440" bIns="45720" rtlCol="0" anchor="t">
+            <a:spAutoFit/>
+          </a:bodyPr>
+          <a:lstStyle>
+            <a:lvl1pPr algn="ctr" defTabSz="914400" rtl="0" eaLnBrk="1" latinLnBrk="0" hangingPunct="1">
+              <a:lnSpc>
+                <a:spcPct val="90000"/>
+              </a:lnSpc>
+              <a:spcBef>
+                <a:spcPct val="0"/>
+              </a:spcBef>
+              <a:buNone/>
+              <a:defRPr sz="6000" kern="1200">
+                <a:solidFill>
+                  <a:schemeClr val="tx1"/>
+                </a:solidFill>
+                <a:latin typeface="+mj-lt"/>
+                <a:ea typeface="+mj-ea"/>
+                <a:cs typeface="+mj-cs"/>
+              </a:defRPr>
+            </a:lvl1pPr>
+          </a:lstStyle>
+          <a:p>
+            <a:pPr algn="l"/>
+            <a:r>
+              <a:rPr lang="en-GB" sz="2800" dirty="0">
+                <a:solidFill>
+                  <a:schemeClr val="bg1"/>
+                </a:solidFill>
+                <a:latin typeface="Verdana Pro Cond SemiBold" panose="020B0604020202020204" pitchFamily="34" charset="0"/>
+              </a:rPr>
+              <a:t>Wired/USB</a:t>
+            </a:r>
+            <a:endParaRPr lang="en-US" sz="2800" dirty="0">
+              <a:solidFill>
+                <a:schemeClr val="bg1"/>
+              </a:solidFill>
+              <a:latin typeface="Verdana Pro Cond SemiBold" panose="020B0604020202020204" pitchFamily="34" charset="0"/>
+            </a:endParaRPr>
+          </a:p>
+        </p:txBody>
+      </p:sp>
+      <p:sp>
+        <p:nvSpPr>
+          <p:cNvPr id="5" name="Title 1">
+            <a:extLst>
+              <a:ext uri="{FF2B5EF4-FFF2-40B4-BE49-F238E27FC236}">
+                <a16:creationId xmlns:a16="http://schemas.microsoft.com/office/drawing/2014/main" id="{92C6B5A3-CF9A-4BB7-B7F6-2044987F4C72}"/>
+              </a:ext>
+            </a:extLst>
+          </p:cNvPr>
+          <p:cNvSpPr txBox="1">
+            <a:spLocks/>
+          </p:cNvSpPr>
+          <p:nvPr/>
+        </p:nvSpPr>
+        <p:spPr>
+          <a:xfrm>
+            <a:off x="7173185" y="1867066"/>
+            <a:ext cx="3175267" cy="480131"/>
+          </a:xfrm>
+          <a:prstGeom prst="rect">
+            <a:avLst/>
+          </a:prstGeom>
+          <a:solidFill>
+            <a:srgbClr val="03849A"/>
+          </a:solidFill>
+        </p:spPr>
+        <p:txBody>
+          <a:bodyPr vert="horz" wrap="square" lIns="91440" tIns="45720" rIns="91440" bIns="45720" rtlCol="0" anchor="t">
+            <a:spAutoFit/>
+          </a:bodyPr>
+          <a:lstStyle>
+            <a:lvl1pPr algn="ctr" defTabSz="914400" rtl="0" eaLnBrk="1" latinLnBrk="0" hangingPunct="1">
+              <a:lnSpc>
+                <a:spcPct val="90000"/>
+              </a:lnSpc>
+              <a:spcBef>
+                <a:spcPct val="0"/>
+              </a:spcBef>
+              <a:buNone/>
+              <a:defRPr sz="6000" kern="1200">
+                <a:solidFill>
+                  <a:schemeClr val="tx1"/>
+                </a:solidFill>
+                <a:latin typeface="+mj-lt"/>
+                <a:ea typeface="+mj-ea"/>
+                <a:cs typeface="+mj-cs"/>
+              </a:defRPr>
+            </a:lvl1pPr>
+          </a:lstStyle>
+          <a:p>
+            <a:pPr algn="l"/>
+            <a:r>
+              <a:rPr lang="en-GB" sz="2800" dirty="0">
+                <a:solidFill>
+                  <a:schemeClr val="bg1"/>
+                </a:solidFill>
+                <a:latin typeface="Verdana Pro Cond SemiBold" panose="020B0604020202020204" pitchFamily="34" charset="0"/>
+              </a:rPr>
+              <a:t>Wireless/Bluetooth</a:t>
+            </a:r>
+            <a:endParaRPr lang="en-US" sz="2800" dirty="0">
+              <a:solidFill>
+                <a:schemeClr val="bg1"/>
+              </a:solidFill>
+              <a:latin typeface="Verdana Pro Cond SemiBold" panose="020B0604020202020204" pitchFamily="34" charset="0"/>
+            </a:endParaRPr>
+          </a:p>
+        </p:txBody>
+      </p:sp>
+      <p:graphicFrame>
+        <p:nvGraphicFramePr>
+          <p:cNvPr id="10" name="Table 9">
+            <a:extLst>
+              <a:ext uri="{FF2B5EF4-FFF2-40B4-BE49-F238E27FC236}">
+                <a16:creationId xmlns:a16="http://schemas.microsoft.com/office/drawing/2014/main" id="{920107A8-DF12-43EF-9A8A-F717B0FE417B}"/>
+              </a:ext>
+            </a:extLst>
+          </p:cNvPr>
+          <p:cNvGraphicFramePr>
+            <a:graphicFrameLocks/>
+          </p:cNvGraphicFramePr>
+          <p:nvPr>
+            <p:extLst>
+              <p:ext uri="{D42A27DB-BD31-4B8C-83A1-F6EECF244321}">
+                <p14:modId xmlns:p14="http://schemas.microsoft.com/office/powerpoint/2010/main" val="3812287379"/>
+              </p:ext>
+            </p:extLst>
+          </p:nvPr>
+        </p:nvGraphicFramePr>
+        <p:xfrm>
+          <a:off x="7173185" y="2574966"/>
+          <a:ext cx="3862550" cy="903706"/>
+        </p:xfrm>
+        <a:graphic>
+          <a:graphicData uri="http://schemas.openxmlformats.org/drawingml/2006/table">
+            <a:tbl>
+              <a:tblPr firstRow="1" bandRow="1">
+                <a:tableStyleId>{5C22544A-7EE6-4342-B048-85BDC9FD1C3A}</a:tableStyleId>
+              </a:tblPr>
+              <a:tblGrid>
+                <a:gridCol w="1784002">
+                  <a:extLst>
+                    <a:ext uri="{9D8B030D-6E8A-4147-A177-3AD203B41FA5}">
+                      <a16:colId xmlns:a16="http://schemas.microsoft.com/office/drawing/2014/main" val="4008364951"/>
+                    </a:ext>
+                  </a:extLst>
+                </a:gridCol>
+                <a:gridCol w="398207">
+                  <a:extLst>
+                    <a:ext uri="{9D8B030D-6E8A-4147-A177-3AD203B41FA5}">
+                      <a16:colId xmlns:a16="http://schemas.microsoft.com/office/drawing/2014/main" val="3554440371"/>
+                    </a:ext>
+                  </a:extLst>
+                </a:gridCol>
+                <a:gridCol w="1680341">
+                  <a:extLst>
+                    <a:ext uri="{9D8B030D-6E8A-4147-A177-3AD203B41FA5}">
+                      <a16:colId xmlns:a16="http://schemas.microsoft.com/office/drawing/2014/main" val="3385093010"/>
+                    </a:ext>
+                  </a:extLst>
+                </a:gridCol>
+              </a:tblGrid>
+              <a:tr h="462291">
+                <a:tc>
+                  <a:txBody>
+                    <a:bodyPr/>
+                    <a:lstStyle/>
+                    <a:p>
+                      <a:pPr algn="ctr"/>
+                      <a:r>
+                        <a:rPr lang="en-GB" sz="1600" dirty="0">
+                          <a:solidFill>
+                            <a:srgbClr val="FACF31"/>
+                          </a:solidFill>
+                          <a:latin typeface="Verdana Pro Cond SemiBold" panose="020B0706030504040204" pitchFamily="34" charset="0"/>
+                        </a:rPr>
+                        <a:t>Component</a:t>
+                      </a:r>
+                      <a:endParaRPr lang="en-US" sz="1600" dirty="0">
+                        <a:solidFill>
+                          <a:srgbClr val="FACF31"/>
+                        </a:solidFill>
+                        <a:latin typeface="Verdana Pro Cond SemiBold" panose="020B0706030504040204" pitchFamily="34" charset="0"/>
+                      </a:endParaRPr>
+                    </a:p>
+                  </a:txBody>
+                  <a:tcPr>
+                    <a:solidFill>
+                      <a:srgbClr val="03849A"/>
+                    </a:solidFill>
+                  </a:tcPr>
+                </a:tc>
+                <a:tc>
+                  <a:txBody>
+                    <a:bodyPr/>
+                    <a:lstStyle/>
+                    <a:p>
+                      <a:pPr algn="ctr"/>
+                      <a:r>
+                        <a:rPr lang="en-GB" sz="1600" dirty="0">
+                          <a:solidFill>
+                            <a:srgbClr val="FACF31"/>
+                          </a:solidFill>
+                          <a:latin typeface="Verdana Pro Cond SemiBold" panose="020B0706030504040204" pitchFamily="34" charset="0"/>
+                        </a:rPr>
+                        <a:t>#</a:t>
                       </a:r>
                       <a:endParaRPr lang="en-US" sz="1600" dirty="0">
                         <a:solidFill>
@@ -5942,9 +7292,12 @@
                     <a:bodyPr/>
                     <a:lstStyle/>
                     <a:p>
-                      <a:endParaRPr lang="en-US" dirty="0">
-                        <a:latin typeface="Verdana Pro Cond SemiBold" panose="020B0706030504040204" pitchFamily="34" charset="0"/>
-                      </a:endParaRPr>
+                      <a:r>
+                        <a:rPr lang="en-US" dirty="0">
+                          <a:latin typeface="Verdana Pro Cond SemiBold" panose="020B0706030504040204" pitchFamily="34" charset="0"/>
+                        </a:rPr>
+                        <a:t>HC-50</a:t>
+                      </a:r>
                     </a:p>
                   </a:txBody>
                   <a:tcPr/>
@@ -5954,9 +7307,12 @@
                     <a:bodyPr/>
                     <a:lstStyle/>
                     <a:p>
-                      <a:endParaRPr lang="en-US" dirty="0">
-                        <a:latin typeface="Verdana Pro Cond SemiBold" panose="020B0706030504040204" pitchFamily="34" charset="0"/>
-                      </a:endParaRPr>
+                      <a:r>
+                        <a:rPr lang="en-US" dirty="0">
+                          <a:latin typeface="Verdana Pro Cond SemiBold" panose="020B0706030504040204" pitchFamily="34" charset="0"/>
+                        </a:rPr>
+                        <a:t>1</a:t>
+                      </a:r>
                     </a:p>
                   </a:txBody>
                   <a:tcPr/>
@@ -5979,378 +7335,16 @@
                   </a:ext>
                 </a:extLst>
               </a:tr>
-              <a:tr h="441415">
-                <a:tc>
-                  <a:txBody>
-                    <a:bodyPr/>
-                    <a:lstStyle/>
-                    <a:p>
-                      <a:endParaRPr lang="en-US" dirty="0">
-                        <a:latin typeface="Verdana Pro Cond SemiBold" panose="020B0706030504040204" pitchFamily="34" charset="0"/>
-                      </a:endParaRPr>
-                    </a:p>
-                  </a:txBody>
-                  <a:tcPr/>
-                </a:tc>
-                <a:tc>
-                  <a:txBody>
-                    <a:bodyPr/>
-                    <a:lstStyle/>
-                    <a:p>
-                      <a:endParaRPr lang="en-US" dirty="0">
-                        <a:latin typeface="Verdana Pro Cond SemiBold" panose="020B0706030504040204" pitchFamily="34" charset="0"/>
-                      </a:endParaRPr>
-                    </a:p>
-                  </a:txBody>
-                  <a:tcPr/>
-                </a:tc>
-                <a:tc>
-                  <a:txBody>
-                    <a:bodyPr/>
-                    <a:lstStyle/>
-                    <a:p>
-                      <a:endParaRPr lang="en-US" dirty="0">
-                        <a:latin typeface="Verdana Pro Cond SemiBold" panose="020B0706030504040204" pitchFamily="34" charset="0"/>
-                      </a:endParaRPr>
-                    </a:p>
-                  </a:txBody>
-                  <a:tcPr/>
-                </a:tc>
-                <a:extLst>
-                  <a:ext uri="{0D108BD9-81ED-4DB2-BD59-A6C34878D82A}">
-                    <a16:rowId xmlns:a16="http://schemas.microsoft.com/office/drawing/2014/main" val="2738096251"/>
-                  </a:ext>
-                </a:extLst>
-              </a:tr>
-              <a:tr h="441415">
-                <a:tc>
-                  <a:txBody>
-                    <a:bodyPr/>
-                    <a:lstStyle/>
-                    <a:p>
-                      <a:endParaRPr lang="en-US">
-                        <a:latin typeface="Verdana Pro Cond SemiBold" panose="020B0706030504040204" pitchFamily="34" charset="0"/>
-                      </a:endParaRPr>
-                    </a:p>
-                  </a:txBody>
-                  <a:tcPr/>
-                </a:tc>
-                <a:tc>
-                  <a:txBody>
-                    <a:bodyPr/>
-                    <a:lstStyle/>
-                    <a:p>
-                      <a:endParaRPr lang="en-US">
-                        <a:latin typeface="Verdana Pro Cond SemiBold" panose="020B0706030504040204" pitchFamily="34" charset="0"/>
-                      </a:endParaRPr>
-                    </a:p>
-                  </a:txBody>
-                  <a:tcPr/>
-                </a:tc>
-                <a:tc>
-                  <a:txBody>
-                    <a:bodyPr/>
-                    <a:lstStyle/>
-                    <a:p>
-                      <a:endParaRPr lang="en-US" dirty="0">
-                        <a:latin typeface="Verdana Pro Cond SemiBold" panose="020B0706030504040204" pitchFamily="34" charset="0"/>
-                      </a:endParaRPr>
-                    </a:p>
-                  </a:txBody>
-                  <a:tcPr/>
-                </a:tc>
-                <a:extLst>
-                  <a:ext uri="{0D108BD9-81ED-4DB2-BD59-A6C34878D82A}">
-                    <a16:rowId xmlns:a16="http://schemas.microsoft.com/office/drawing/2014/main" val="2961306089"/>
-                  </a:ext>
-                </a:extLst>
-              </a:tr>
             </a:tbl>
           </a:graphicData>
         </a:graphic>
       </p:graphicFrame>
-      <p:sp>
-        <p:nvSpPr>
-          <p:cNvPr id="4" name="Title 1">
-            <a:extLst>
-              <a:ext uri="{FF2B5EF4-FFF2-40B4-BE49-F238E27FC236}">
-                <a16:creationId xmlns:a16="http://schemas.microsoft.com/office/drawing/2014/main" id="{6B8645AE-7722-4D5E-A028-00E8CEF7CBF6}"/>
-              </a:ext>
-            </a:extLst>
-          </p:cNvPr>
-          <p:cNvSpPr txBox="1">
-            <a:spLocks/>
-          </p:cNvSpPr>
-          <p:nvPr/>
-        </p:nvSpPr>
-        <p:spPr>
-          <a:xfrm>
-            <a:off x="2904741" y="1330315"/>
-            <a:ext cx="1141066" cy="480131"/>
-          </a:xfrm>
-          <a:prstGeom prst="rect">
-            <a:avLst/>
-          </a:prstGeom>
-          <a:solidFill>
-            <a:srgbClr val="03849A"/>
-          </a:solidFill>
-        </p:spPr>
-        <p:txBody>
-          <a:bodyPr vert="horz" wrap="square" lIns="91440" tIns="45720" rIns="91440" bIns="45720" rtlCol="0" anchor="t">
-            <a:spAutoFit/>
-          </a:bodyPr>
-          <a:lstStyle>
-            <a:lvl1pPr algn="ctr" defTabSz="914400" rtl="0" eaLnBrk="1" latinLnBrk="0" hangingPunct="1">
-              <a:lnSpc>
-                <a:spcPct val="90000"/>
-              </a:lnSpc>
-              <a:spcBef>
-                <a:spcPct val="0"/>
-              </a:spcBef>
-              <a:buNone/>
-              <a:defRPr sz="6000" kern="1200">
-                <a:solidFill>
-                  <a:schemeClr val="tx1"/>
-                </a:solidFill>
-                <a:latin typeface="+mj-lt"/>
-                <a:ea typeface="+mj-ea"/>
-                <a:cs typeface="+mj-cs"/>
-              </a:defRPr>
-            </a:lvl1pPr>
-          </a:lstStyle>
-          <a:p>
-            <a:pPr algn="l"/>
-            <a:r>
-              <a:rPr lang="en-GB" sz="2800" dirty="0">
-                <a:solidFill>
-                  <a:schemeClr val="bg1"/>
-                </a:solidFill>
-                <a:latin typeface="Verdana Pro Cond SemiBold" panose="020B0604020202020204" pitchFamily="34" charset="0"/>
-              </a:rPr>
-              <a:t>Wired</a:t>
-            </a:r>
-            <a:endParaRPr lang="en-US" sz="2800" dirty="0">
-              <a:solidFill>
-                <a:schemeClr val="bg1"/>
-              </a:solidFill>
-              <a:latin typeface="Verdana Pro Cond SemiBold" panose="020B0604020202020204" pitchFamily="34" charset="0"/>
-            </a:endParaRPr>
-          </a:p>
-        </p:txBody>
-      </p:sp>
-      <p:sp>
-        <p:nvSpPr>
-          <p:cNvPr id="5" name="Title 1">
-            <a:extLst>
-              <a:ext uri="{FF2B5EF4-FFF2-40B4-BE49-F238E27FC236}">
-                <a16:creationId xmlns:a16="http://schemas.microsoft.com/office/drawing/2014/main" id="{92C6B5A3-CF9A-4BB7-B7F6-2044987F4C72}"/>
-              </a:ext>
-            </a:extLst>
-          </p:cNvPr>
-          <p:cNvSpPr txBox="1">
-            <a:spLocks/>
-          </p:cNvSpPr>
-          <p:nvPr/>
-        </p:nvSpPr>
-        <p:spPr>
-          <a:xfrm>
-            <a:off x="7553957" y="1333387"/>
-            <a:ext cx="1521372" cy="480131"/>
-          </a:xfrm>
-          <a:prstGeom prst="rect">
-            <a:avLst/>
-          </a:prstGeom>
-          <a:solidFill>
-            <a:srgbClr val="03849A"/>
-          </a:solidFill>
-        </p:spPr>
-        <p:txBody>
-          <a:bodyPr vert="horz" wrap="square" lIns="91440" tIns="45720" rIns="91440" bIns="45720" rtlCol="0" anchor="t">
-            <a:spAutoFit/>
-          </a:bodyPr>
-          <a:lstStyle>
-            <a:lvl1pPr algn="ctr" defTabSz="914400" rtl="0" eaLnBrk="1" latinLnBrk="0" hangingPunct="1">
-              <a:lnSpc>
-                <a:spcPct val="90000"/>
-              </a:lnSpc>
-              <a:spcBef>
-                <a:spcPct val="0"/>
-              </a:spcBef>
-              <a:buNone/>
-              <a:defRPr sz="6000" kern="1200">
-                <a:solidFill>
-                  <a:schemeClr val="tx1"/>
-                </a:solidFill>
-                <a:latin typeface="+mj-lt"/>
-                <a:ea typeface="+mj-ea"/>
-                <a:cs typeface="+mj-cs"/>
-              </a:defRPr>
-            </a:lvl1pPr>
-          </a:lstStyle>
-          <a:p>
-            <a:pPr algn="l"/>
-            <a:r>
-              <a:rPr lang="en-GB" sz="2800" dirty="0">
-                <a:solidFill>
-                  <a:schemeClr val="bg1"/>
-                </a:solidFill>
-                <a:latin typeface="Verdana Pro Cond SemiBold" panose="020B0604020202020204" pitchFamily="34" charset="0"/>
-              </a:rPr>
-              <a:t>Wireless</a:t>
-            </a:r>
-            <a:endParaRPr lang="en-US" sz="2800" dirty="0">
-              <a:solidFill>
-                <a:schemeClr val="bg1"/>
-              </a:solidFill>
-              <a:latin typeface="Verdana Pro Cond SemiBold" panose="020B0604020202020204" pitchFamily="34" charset="0"/>
-            </a:endParaRPr>
-          </a:p>
-        </p:txBody>
-      </p:sp>
-      <p:sp>
-        <p:nvSpPr>
-          <p:cNvPr id="7" name="Title 1">
-            <a:extLst>
-              <a:ext uri="{FF2B5EF4-FFF2-40B4-BE49-F238E27FC236}">
-                <a16:creationId xmlns:a16="http://schemas.microsoft.com/office/drawing/2014/main" id="{ADE463C5-EFF0-4387-9304-FEA6F95E94B4}"/>
-              </a:ext>
-            </a:extLst>
-          </p:cNvPr>
-          <p:cNvSpPr txBox="1">
-            <a:spLocks/>
-          </p:cNvSpPr>
-          <p:nvPr/>
-        </p:nvSpPr>
-        <p:spPr>
-          <a:xfrm>
-            <a:off x="4173583" y="1325563"/>
-            <a:ext cx="878308" cy="480131"/>
-          </a:xfrm>
-          <a:prstGeom prst="rect">
-            <a:avLst/>
-          </a:prstGeom>
-          <a:solidFill>
-            <a:srgbClr val="03849A"/>
-          </a:solidFill>
-        </p:spPr>
-        <p:txBody>
-          <a:bodyPr vert="horz" wrap="square" lIns="91440" tIns="45720" rIns="91440" bIns="45720" rtlCol="0" anchor="t">
-            <a:spAutoFit/>
-          </a:bodyPr>
-          <a:lstStyle>
-            <a:lvl1pPr algn="ctr" defTabSz="914400" rtl="0" eaLnBrk="1" latinLnBrk="0" hangingPunct="1">
-              <a:lnSpc>
-                <a:spcPct val="90000"/>
-              </a:lnSpc>
-              <a:spcBef>
-                <a:spcPct val="0"/>
-              </a:spcBef>
-              <a:buNone/>
-              <a:defRPr sz="6000" kern="1200">
-                <a:solidFill>
-                  <a:schemeClr val="tx1"/>
-                </a:solidFill>
-                <a:latin typeface="+mj-lt"/>
-                <a:ea typeface="+mj-ea"/>
-                <a:cs typeface="+mj-cs"/>
-              </a:defRPr>
-            </a:lvl1pPr>
-          </a:lstStyle>
-          <a:p>
-            <a:pPr algn="l"/>
-            <a:r>
-              <a:rPr lang="en-GB" sz="2800" dirty="0">
-                <a:solidFill>
-                  <a:schemeClr val="bg1"/>
-                </a:solidFill>
-                <a:latin typeface="Verdana Pro Cond SemiBold" panose="020B0604020202020204" pitchFamily="34" charset="0"/>
-              </a:rPr>
-              <a:t>USB</a:t>
-            </a:r>
-            <a:endParaRPr lang="en-US" sz="2800" dirty="0">
-              <a:solidFill>
-                <a:schemeClr val="bg1"/>
-              </a:solidFill>
-              <a:latin typeface="Verdana Pro Cond SemiBold" panose="020B0604020202020204" pitchFamily="34" charset="0"/>
-            </a:endParaRPr>
-          </a:p>
-        </p:txBody>
-      </p:sp>
-      <p:sp>
-        <p:nvSpPr>
-          <p:cNvPr id="8" name="Title 1">
-            <a:extLst>
-              <a:ext uri="{FF2B5EF4-FFF2-40B4-BE49-F238E27FC236}">
-                <a16:creationId xmlns:a16="http://schemas.microsoft.com/office/drawing/2014/main" id="{C8D56873-B200-4229-9EDB-7D4684C5B02C}"/>
-              </a:ext>
-            </a:extLst>
-          </p:cNvPr>
-          <p:cNvSpPr txBox="1">
-            <a:spLocks/>
-          </p:cNvSpPr>
-          <p:nvPr/>
-        </p:nvSpPr>
-        <p:spPr>
-          <a:xfrm>
-            <a:off x="9192950" y="1333388"/>
-            <a:ext cx="1740437" cy="480131"/>
-          </a:xfrm>
-          <a:prstGeom prst="rect">
-            <a:avLst/>
-          </a:prstGeom>
-          <a:solidFill>
-            <a:srgbClr val="03849A"/>
-          </a:solidFill>
-        </p:spPr>
-        <p:txBody>
-          <a:bodyPr vert="horz" wrap="square" lIns="91440" tIns="45720" rIns="91440" bIns="45720" rtlCol="0" anchor="t">
-            <a:spAutoFit/>
-          </a:bodyPr>
-          <a:lstStyle>
-            <a:lvl1pPr algn="ctr" defTabSz="914400" rtl="0" eaLnBrk="1" latinLnBrk="0" hangingPunct="1">
-              <a:lnSpc>
-                <a:spcPct val="90000"/>
-              </a:lnSpc>
-              <a:spcBef>
-                <a:spcPct val="0"/>
-              </a:spcBef>
-              <a:buNone/>
-              <a:defRPr sz="6000" kern="1200">
-                <a:solidFill>
-                  <a:schemeClr val="tx1"/>
-                </a:solidFill>
-                <a:latin typeface="+mj-lt"/>
-                <a:ea typeface="+mj-ea"/>
-                <a:cs typeface="+mj-cs"/>
-              </a:defRPr>
-            </a:lvl1pPr>
-          </a:lstStyle>
-          <a:p>
-            <a:pPr algn="l"/>
-            <a:r>
-              <a:rPr lang="en-GB" sz="2800" dirty="0">
-                <a:solidFill>
-                  <a:schemeClr val="bg1"/>
-                </a:solidFill>
-                <a:latin typeface="Verdana Pro Cond SemiBold" panose="020B0604020202020204" pitchFamily="34" charset="0"/>
-              </a:rPr>
-              <a:t>Bluetooth</a:t>
-            </a:r>
-            <a:endParaRPr lang="en-US" sz="2800" dirty="0">
-              <a:solidFill>
-                <a:schemeClr val="bg1"/>
-              </a:solidFill>
-              <a:latin typeface="Verdana Pro Cond SemiBold" panose="020B0604020202020204" pitchFamily="34" charset="0"/>
-            </a:endParaRPr>
-          </a:p>
-        </p:txBody>
-      </p:sp>
       <p:graphicFrame>
         <p:nvGraphicFramePr>
-          <p:cNvPr id="10" name="Table 9">
-            <a:extLst>
-              <a:ext uri="{FF2B5EF4-FFF2-40B4-BE49-F238E27FC236}">
-                <a16:creationId xmlns:a16="http://schemas.microsoft.com/office/drawing/2014/main" id="{920107A8-DF12-43EF-9A8A-F717B0FE417B}"/>
+          <p:cNvPr id="11" name="Table 10">
+            <a:extLst>
+              <a:ext uri="{FF2B5EF4-FFF2-40B4-BE49-F238E27FC236}">
+                <a16:creationId xmlns:a16="http://schemas.microsoft.com/office/drawing/2014/main" id="{87804226-06A4-4AD1-A7BE-8B82BE46961C}"/>
               </a:ext>
             </a:extLst>
           </p:cNvPr>
@@ -6360,14 +7354,14 @@
           <p:nvPr>
             <p:extLst>
               <p:ext uri="{D42A27DB-BD31-4B8C-83A1-F6EECF244321}">
-                <p14:modId xmlns:p14="http://schemas.microsoft.com/office/powerpoint/2010/main" val="2596102539"/>
+                <p14:modId xmlns:p14="http://schemas.microsoft.com/office/powerpoint/2010/main" val="2846162228"/>
               </p:ext>
             </p:extLst>
           </p:nvPr>
         </p:nvGraphicFramePr>
         <p:xfrm>
-          <a:off x="7261675" y="2158399"/>
-          <a:ext cx="3862550" cy="1786536"/>
+          <a:off x="7173185" y="4782041"/>
+          <a:ext cx="3862550" cy="903706"/>
         </p:xfrm>
         <a:graphic>
           <a:graphicData uri="http://schemas.openxmlformats.org/drawingml/2006/table">
@@ -6376,21 +7370,21 @@
                 <a:tableStyleId>{5C22544A-7EE6-4342-B048-85BDC9FD1C3A}</a:tableStyleId>
               </a:tblPr>
               <a:tblGrid>
-                <a:gridCol w="1229709">
+                <a:gridCol w="1808583">
                   <a:extLst>
                     <a:ext uri="{9D8B030D-6E8A-4147-A177-3AD203B41FA5}">
                       <a16:colId xmlns:a16="http://schemas.microsoft.com/office/drawing/2014/main" val="4008364951"/>
                     </a:ext>
                   </a:extLst>
                 </a:gridCol>
-                <a:gridCol w="1270857">
+                <a:gridCol w="442451">
                   <a:extLst>
                     <a:ext uri="{9D8B030D-6E8A-4147-A177-3AD203B41FA5}">
                       <a16:colId xmlns:a16="http://schemas.microsoft.com/office/drawing/2014/main" val="3554440371"/>
                     </a:ext>
                   </a:extLst>
                 </a:gridCol>
-                <a:gridCol w="1361984">
+                <a:gridCol w="1611516">
                   <a:extLst>
                     <a:ext uri="{9D8B030D-6E8A-4147-A177-3AD203B41FA5}">
                       <a16:colId xmlns:a16="http://schemas.microsoft.com/office/drawing/2014/main" val="3385093010"/>
@@ -6441,7 +7435,7 @@
                           </a:solidFill>
                           <a:latin typeface="Verdana Pro Cond SemiBold" panose="020B0706030504040204" pitchFamily="34" charset="0"/>
                         </a:rPr>
-                        <a:t>Quantity</a:t>
+                        <a:t>#</a:t>
                       </a:r>
                       <a:endParaRPr lang="en-US" sz="1600" dirty="0">
                         <a:solidFill>
@@ -6498,9 +7492,12 @@
                     <a:bodyPr/>
                     <a:lstStyle/>
                     <a:p>
-                      <a:endParaRPr lang="en-US">
-                        <a:latin typeface="Verdana Pro Cond SemiBold" panose="020B0706030504040204" pitchFamily="34" charset="0"/>
-                      </a:endParaRPr>
+                      <a:r>
+                        <a:rPr lang="en-US" dirty="0">
+                          <a:latin typeface="Verdana Pro Cond SemiBold" panose="020B0706030504040204" pitchFamily="34" charset="0"/>
+                        </a:rPr>
+                        <a:t>Buck Converter</a:t>
+                      </a:r>
                     </a:p>
                   </a:txBody>
                   <a:tcPr/>
@@ -6510,95 +7507,12 @@
                     <a:bodyPr/>
                     <a:lstStyle/>
                     <a:p>
-                      <a:endParaRPr lang="en-US" dirty="0">
-                        <a:latin typeface="Verdana Pro Cond SemiBold" panose="020B0706030504040204" pitchFamily="34" charset="0"/>
-                      </a:endParaRPr>
-                    </a:p>
-                  </a:txBody>
-                  <a:tcPr/>
-                </a:tc>
-                <a:tc>
-                  <a:txBody>
-                    <a:bodyPr/>
-                    <a:lstStyle/>
-                    <a:p>
-                      <a:endParaRPr lang="en-US">
-                        <a:latin typeface="Verdana Pro Cond SemiBold" panose="020B0706030504040204" pitchFamily="34" charset="0"/>
-                      </a:endParaRPr>
-                    </a:p>
-                  </a:txBody>
-                  <a:tcPr/>
-                </a:tc>
-                <a:extLst>
-                  <a:ext uri="{0D108BD9-81ED-4DB2-BD59-A6C34878D82A}">
-                    <a16:rowId xmlns:a16="http://schemas.microsoft.com/office/drawing/2014/main" val="250704751"/>
-                  </a:ext>
-                </a:extLst>
-              </a:tr>
-              <a:tr h="441415">
-                <a:tc>
-                  <a:txBody>
-                    <a:bodyPr/>
-                    <a:lstStyle/>
-                    <a:p>
-                      <a:endParaRPr lang="en-US">
-                        <a:latin typeface="Verdana Pro Cond SemiBold" panose="020B0706030504040204" pitchFamily="34" charset="0"/>
-                      </a:endParaRPr>
-                    </a:p>
-                  </a:txBody>
-                  <a:tcPr/>
-                </a:tc>
-                <a:tc>
-                  <a:txBody>
-                    <a:bodyPr/>
-                    <a:lstStyle/>
-                    <a:p>
-                      <a:endParaRPr lang="en-US">
-                        <a:latin typeface="Verdana Pro Cond SemiBold" panose="020B0706030504040204" pitchFamily="34" charset="0"/>
-                      </a:endParaRPr>
-                    </a:p>
-                  </a:txBody>
-                  <a:tcPr/>
-                </a:tc>
-                <a:tc>
-                  <a:txBody>
-                    <a:bodyPr/>
-                    <a:lstStyle/>
-                    <a:p>
-                      <a:endParaRPr lang="en-US">
-                        <a:latin typeface="Verdana Pro Cond SemiBold" panose="020B0706030504040204" pitchFamily="34" charset="0"/>
-                      </a:endParaRPr>
-                    </a:p>
-                  </a:txBody>
-                  <a:tcPr/>
-                </a:tc>
-                <a:extLst>
-                  <a:ext uri="{0D108BD9-81ED-4DB2-BD59-A6C34878D82A}">
-                    <a16:rowId xmlns:a16="http://schemas.microsoft.com/office/drawing/2014/main" val="2738096251"/>
-                  </a:ext>
-                </a:extLst>
-              </a:tr>
-              <a:tr h="441415">
-                <a:tc>
-                  <a:txBody>
-                    <a:bodyPr/>
-                    <a:lstStyle/>
-                    <a:p>
-                      <a:endParaRPr lang="en-US">
-                        <a:latin typeface="Verdana Pro Cond SemiBold" panose="020B0706030504040204" pitchFamily="34" charset="0"/>
-                      </a:endParaRPr>
-                    </a:p>
-                  </a:txBody>
-                  <a:tcPr/>
-                </a:tc>
-                <a:tc>
-                  <a:txBody>
-                    <a:bodyPr/>
-                    <a:lstStyle/>
-                    <a:p>
-                      <a:endParaRPr lang="en-US">
-                        <a:latin typeface="Verdana Pro Cond SemiBold" panose="020B0706030504040204" pitchFamily="34" charset="0"/>
-                      </a:endParaRPr>
+                      <a:r>
+                        <a:rPr lang="en-US" dirty="0">
+                          <a:latin typeface="Verdana Pro Cond SemiBold" panose="020B0706030504040204" pitchFamily="34" charset="0"/>
+                        </a:rPr>
+                        <a:t>1</a:t>
+                      </a:r>
                     </a:p>
                   </a:txBody>
                   <a:tcPr/>
@@ -6617,7 +7531,7 @@
                 </a:tc>
                 <a:extLst>
                   <a:ext uri="{0D108BD9-81ED-4DB2-BD59-A6C34878D82A}">
-                    <a16:rowId xmlns:a16="http://schemas.microsoft.com/office/drawing/2014/main" val="2961306089"/>
+                    <a16:rowId xmlns:a16="http://schemas.microsoft.com/office/drawing/2014/main" val="250704751"/>
                   </a:ext>
                 </a:extLst>
               </a:tr>
@@ -6625,6 +7539,75 @@
           </a:graphicData>
         </a:graphic>
       </p:graphicFrame>
+      <p:sp>
+        <p:nvSpPr>
+          <p:cNvPr id="12" name="Title 1">
+            <a:extLst>
+              <a:ext uri="{FF2B5EF4-FFF2-40B4-BE49-F238E27FC236}">
+                <a16:creationId xmlns:a16="http://schemas.microsoft.com/office/drawing/2014/main" id="{3B556E3E-C1E6-4A72-906F-7B78AE146DEE}"/>
+              </a:ext>
+            </a:extLst>
+          </p:cNvPr>
+          <p:cNvSpPr txBox="1">
+            <a:spLocks/>
+          </p:cNvSpPr>
+          <p:nvPr/>
+        </p:nvSpPr>
+        <p:spPr>
+          <a:xfrm>
+            <a:off x="7173185" y="4130356"/>
+            <a:ext cx="2460198" cy="480131"/>
+          </a:xfrm>
+          <a:prstGeom prst="rect">
+            <a:avLst/>
+          </a:prstGeom>
+          <a:solidFill>
+            <a:srgbClr val="03849A"/>
+          </a:solidFill>
+        </p:spPr>
+        <p:txBody>
+          <a:bodyPr vert="horz" wrap="square" lIns="91440" tIns="45720" rIns="91440" bIns="45720" rtlCol="0" anchor="t">
+            <a:spAutoFit/>
+          </a:bodyPr>
+          <a:lstStyle>
+            <a:lvl1pPr algn="ctr" defTabSz="914400" rtl="0" eaLnBrk="1" latinLnBrk="0" hangingPunct="1">
+              <a:lnSpc>
+                <a:spcPct val="90000"/>
+              </a:lnSpc>
+              <a:spcBef>
+                <a:spcPct val="0"/>
+              </a:spcBef>
+              <a:buNone/>
+              <a:defRPr sz="6000" kern="1200">
+                <a:solidFill>
+                  <a:schemeClr val="tx1"/>
+                </a:solidFill>
+                <a:latin typeface="+mj-lt"/>
+                <a:ea typeface="+mj-ea"/>
+                <a:cs typeface="+mj-cs"/>
+              </a:defRPr>
+            </a:lvl1pPr>
+          </a:lstStyle>
+          <a:p>
+            <a:pPr algn="l"/>
+            <a:r>
+              <a:rPr lang="en-GB" sz="2800" dirty="0">
+                <a:solidFill>
+                  <a:schemeClr val="bg1"/>
+                </a:solidFill>
+                <a:latin typeface="Verdana Pro Cond SemiBold" panose="020B0604020202020204" pitchFamily="34" charset="0"/>
+              </a:rPr>
+              <a:t>Battery Power</a:t>
+            </a:r>
+            <a:endParaRPr lang="en-US" sz="2800" dirty="0">
+              <a:solidFill>
+                <a:schemeClr val="bg1"/>
+              </a:solidFill>
+              <a:latin typeface="Verdana Pro Cond SemiBold" panose="020B0604020202020204" pitchFamily="34" charset="0"/>
+            </a:endParaRPr>
+          </a:p>
+        </p:txBody>
+      </p:sp>
     </p:spTree>
     <p:extLst>
       <p:ext uri="{BB962C8B-B14F-4D97-AF65-F5344CB8AC3E}">

</xml_diff>